<commit_message>
Added materials for WP Day 2 (Bootstrap 4)
</commit_message>
<xml_diff>
--- a/20_Bootstrap/BootstrapOverview.pptx
+++ b/20_Bootstrap/BootstrapOverview.pptx
@@ -9,16 +9,15 @@
     <p:sldId id="257" r:id="rId3"/>
     <p:sldId id="258" r:id="rId4"/>
     <p:sldId id="259" r:id="rId5"/>
-    <p:sldId id="260" r:id="rId6"/>
-    <p:sldId id="261" r:id="rId7"/>
-    <p:sldId id="262" r:id="rId8"/>
-    <p:sldId id="263" r:id="rId9"/>
-    <p:sldId id="264" r:id="rId10"/>
-    <p:sldId id="265" r:id="rId11"/>
-    <p:sldId id="266" r:id="rId12"/>
-    <p:sldId id="267" r:id="rId13"/>
-    <p:sldId id="268" r:id="rId14"/>
-    <p:sldId id="269" r:id="rId15"/>
+    <p:sldId id="270" r:id="rId6"/>
+    <p:sldId id="263" r:id="rId7"/>
+    <p:sldId id="264" r:id="rId8"/>
+    <p:sldId id="265" r:id="rId9"/>
+    <p:sldId id="266" r:id="rId10"/>
+    <p:sldId id="267" r:id="rId11"/>
+    <p:sldId id="268" r:id="rId12"/>
+    <p:sldId id="269" r:id="rId13"/>
+    <p:sldId id="271" r:id="rId14"/>
   </p:sldIdLst>
   <p:sldSz cx="12192000" cy="6858000"/>
   <p:notesSz cx="6858000" cy="9144000"/>
@@ -256,7 +255,7 @@
           <a:p>
             <a:fld id="{04527E70-C461-477F-BF52-CFCF7D612977}" type="datetimeFigureOut">
               <a:rPr lang="da-DK" smtClean="0"/>
-              <a:t>04-02-2019</a:t>
+              <a:t>12-02-2019</a:t>
             </a:fld>
             <a:endParaRPr lang="da-DK"/>
           </a:p>
@@ -426,7 +425,7 @@
           <a:p>
             <a:fld id="{04527E70-C461-477F-BF52-CFCF7D612977}" type="datetimeFigureOut">
               <a:rPr lang="da-DK" smtClean="0"/>
-              <a:t>04-02-2019</a:t>
+              <a:t>12-02-2019</a:t>
             </a:fld>
             <a:endParaRPr lang="da-DK"/>
           </a:p>
@@ -606,7 +605,7 @@
           <a:p>
             <a:fld id="{04527E70-C461-477F-BF52-CFCF7D612977}" type="datetimeFigureOut">
               <a:rPr lang="da-DK" smtClean="0"/>
-              <a:t>04-02-2019</a:t>
+              <a:t>12-02-2019</a:t>
             </a:fld>
             <a:endParaRPr lang="da-DK"/>
           </a:p>
@@ -776,7 +775,7 @@
           <a:p>
             <a:fld id="{04527E70-C461-477F-BF52-CFCF7D612977}" type="datetimeFigureOut">
               <a:rPr lang="da-DK" smtClean="0"/>
-              <a:t>04-02-2019</a:t>
+              <a:t>12-02-2019</a:t>
             </a:fld>
             <a:endParaRPr lang="da-DK"/>
           </a:p>
@@ -1022,7 +1021,7 @@
           <a:p>
             <a:fld id="{04527E70-C461-477F-BF52-CFCF7D612977}" type="datetimeFigureOut">
               <a:rPr lang="da-DK" smtClean="0"/>
-              <a:t>04-02-2019</a:t>
+              <a:t>12-02-2019</a:t>
             </a:fld>
             <a:endParaRPr lang="da-DK"/>
           </a:p>
@@ -1254,7 +1253,7 @@
           <a:p>
             <a:fld id="{04527E70-C461-477F-BF52-CFCF7D612977}" type="datetimeFigureOut">
               <a:rPr lang="da-DK" smtClean="0"/>
-              <a:t>04-02-2019</a:t>
+              <a:t>12-02-2019</a:t>
             </a:fld>
             <a:endParaRPr lang="da-DK"/>
           </a:p>
@@ -1621,7 +1620,7 @@
           <a:p>
             <a:fld id="{04527E70-C461-477F-BF52-CFCF7D612977}" type="datetimeFigureOut">
               <a:rPr lang="da-DK" smtClean="0"/>
-              <a:t>04-02-2019</a:t>
+              <a:t>12-02-2019</a:t>
             </a:fld>
             <a:endParaRPr lang="da-DK"/>
           </a:p>
@@ -1739,7 +1738,7 @@
           <a:p>
             <a:fld id="{04527E70-C461-477F-BF52-CFCF7D612977}" type="datetimeFigureOut">
               <a:rPr lang="da-DK" smtClean="0"/>
-              <a:t>04-02-2019</a:t>
+              <a:t>12-02-2019</a:t>
             </a:fld>
             <a:endParaRPr lang="da-DK"/>
           </a:p>
@@ -1834,7 +1833,7 @@
           <a:p>
             <a:fld id="{04527E70-C461-477F-BF52-CFCF7D612977}" type="datetimeFigureOut">
               <a:rPr lang="da-DK" smtClean="0"/>
-              <a:t>04-02-2019</a:t>
+              <a:t>12-02-2019</a:t>
             </a:fld>
             <a:endParaRPr lang="da-DK"/>
           </a:p>
@@ -2111,7 +2110,7 @@
           <a:p>
             <a:fld id="{04527E70-C461-477F-BF52-CFCF7D612977}" type="datetimeFigureOut">
               <a:rPr lang="da-DK" smtClean="0"/>
-              <a:t>04-02-2019</a:t>
+              <a:t>12-02-2019</a:t>
             </a:fld>
             <a:endParaRPr lang="da-DK"/>
           </a:p>
@@ -2364,7 +2363,7 @@
           <a:p>
             <a:fld id="{04527E70-C461-477F-BF52-CFCF7D612977}" type="datetimeFigureOut">
               <a:rPr lang="da-DK" smtClean="0"/>
-              <a:t>04-02-2019</a:t>
+              <a:t>12-02-2019</a:t>
             </a:fld>
             <a:endParaRPr lang="da-DK"/>
           </a:p>
@@ -2577,7 +2576,7 @@
           <a:p>
             <a:fld id="{04527E70-C461-477F-BF52-CFCF7D612977}" type="datetimeFigureOut">
               <a:rPr lang="da-DK" smtClean="0"/>
-              <a:t>04-02-2019</a:t>
+              <a:t>12-02-2019</a:t>
             </a:fld>
             <a:endParaRPr lang="da-DK"/>
           </a:p>
@@ -3107,702 +3106,6 @@
           <a:lstStyle/>
           <a:p>
             <a:r>
-              <a:rPr lang="da-DK" b="1"/>
-              <a:t>Bootstrap, styling with classes</a:t>
-            </a:r>
-            <a:endParaRPr lang="da-DK" b="1"/>
-          </a:p>
-        </p:txBody>
-      </p:sp>
-      <p:sp>
-        <p:nvSpPr>
-          <p:cNvPr id="5" name="Tekstfelt 4"/>
-          <p:cNvSpPr txBox="1"/>
-          <p:nvPr/>
-        </p:nvSpPr>
-        <p:spPr>
-          <a:xfrm>
-            <a:off x="920578" y="1797907"/>
-            <a:ext cx="10886303" cy="2462213"/>
-          </a:xfrm>
-          <a:prstGeom prst="rect">
-            <a:avLst/>
-          </a:prstGeom>
-          <a:noFill/>
-        </p:spPr>
-        <p:txBody>
-          <a:bodyPr wrap="square" rtlCol="0">
-            <a:spAutoFit/>
-          </a:bodyPr>
-          <a:lstStyle/>
-          <a:p>
-            <a:r>
-              <a:rPr lang="en-US" sz="3200" b="1" smtClean="0">
-                <a:solidFill>
-                  <a:srgbClr val="808080"/>
-                </a:solidFill>
-                <a:latin typeface="Consolas" panose="020B0609020204030204" pitchFamily="49" charset="0"/>
-              </a:rPr>
-              <a:t>&lt;</a:t>
-            </a:r>
-            <a:r>
-              <a:rPr lang="en-US" sz="3200" b="1" smtClean="0">
-                <a:solidFill>
-                  <a:srgbClr val="569CD6"/>
-                </a:solidFill>
-                <a:latin typeface="Consolas" panose="020B0609020204030204" pitchFamily="49" charset="0"/>
-              </a:rPr>
-              <a:t>div</a:t>
-            </a:r>
-            <a:r>
-              <a:rPr lang="en-US" sz="3200" b="1" smtClean="0">
-                <a:solidFill>
-                  <a:srgbClr val="808080"/>
-                </a:solidFill>
-                <a:latin typeface="Consolas" panose="020B0609020204030204" pitchFamily="49" charset="0"/>
-              </a:rPr>
-              <a:t>&gt;</a:t>
-            </a:r>
-            <a:r>
-              <a:rPr lang="en-US" sz="3200" b="1" smtClean="0">
-                <a:solidFill>
-                  <a:srgbClr val="D4D4D4"/>
-                </a:solidFill>
-                <a:latin typeface="Consolas" panose="020B0609020204030204" pitchFamily="49" charset="0"/>
-              </a:rPr>
-              <a:t> </a:t>
-            </a:r>
-            <a:endParaRPr lang="en-US" sz="3200" b="1">
-              <a:solidFill>
-                <a:srgbClr val="D4D4D4"/>
-              </a:solidFill>
-              <a:latin typeface="Consolas" panose="020B0609020204030204" pitchFamily="49" charset="0"/>
-            </a:endParaRPr>
-          </a:p>
-          <a:p>
-            <a:r>
-              <a:rPr lang="en-US" sz="3200" b="1">
-                <a:solidFill>
-                  <a:srgbClr val="808080"/>
-                </a:solidFill>
-                <a:latin typeface="Consolas" panose="020B0609020204030204" pitchFamily="49" charset="0"/>
-              </a:rPr>
-              <a:t> </a:t>
-            </a:r>
-            <a:r>
-              <a:rPr lang="en-US" sz="3200" b="1" smtClean="0">
-                <a:solidFill>
-                  <a:srgbClr val="808080"/>
-                </a:solidFill>
-                <a:latin typeface="Consolas" panose="020B0609020204030204" pitchFamily="49" charset="0"/>
-              </a:rPr>
-              <a:t> &lt;</a:t>
-            </a:r>
-            <a:r>
-              <a:rPr lang="en-US" sz="3200" b="1">
-                <a:solidFill>
-                  <a:srgbClr val="569CD6"/>
-                </a:solidFill>
-                <a:latin typeface="Consolas" panose="020B0609020204030204" pitchFamily="49" charset="0"/>
-              </a:rPr>
-              <a:t>h1</a:t>
-            </a:r>
-            <a:r>
-              <a:rPr lang="en-US" sz="3200" b="1">
-                <a:solidFill>
-                  <a:srgbClr val="808080"/>
-                </a:solidFill>
-                <a:latin typeface="Consolas" panose="020B0609020204030204" pitchFamily="49" charset="0"/>
-              </a:rPr>
-              <a:t>&gt;</a:t>
-            </a:r>
-            <a:r>
-              <a:rPr lang="en-US" sz="3200" b="1">
-                <a:solidFill>
-                  <a:srgbClr val="D4D4D4"/>
-                </a:solidFill>
-                <a:latin typeface="Consolas" panose="020B0609020204030204" pitchFamily="49" charset="0"/>
-              </a:rPr>
-              <a:t>This is a Level 1 Heading</a:t>
-            </a:r>
-            <a:r>
-              <a:rPr lang="en-US" sz="3200" b="1">
-                <a:solidFill>
-                  <a:srgbClr val="808080"/>
-                </a:solidFill>
-                <a:latin typeface="Consolas" panose="020B0609020204030204" pitchFamily="49" charset="0"/>
-              </a:rPr>
-              <a:t>&lt;/</a:t>
-            </a:r>
-            <a:r>
-              <a:rPr lang="en-US" sz="3200" b="1">
-                <a:solidFill>
-                  <a:srgbClr val="569CD6"/>
-                </a:solidFill>
-                <a:latin typeface="Consolas" panose="020B0609020204030204" pitchFamily="49" charset="0"/>
-              </a:rPr>
-              <a:t>h1</a:t>
-            </a:r>
-            <a:r>
-              <a:rPr lang="en-US" sz="3200" b="1">
-                <a:solidFill>
-                  <a:srgbClr val="808080"/>
-                </a:solidFill>
-                <a:latin typeface="Consolas" panose="020B0609020204030204" pitchFamily="49" charset="0"/>
-              </a:rPr>
-              <a:t>&gt;</a:t>
-            </a:r>
-            <a:endParaRPr lang="en-US" sz="3200" b="1">
-              <a:solidFill>
-                <a:srgbClr val="D4D4D4"/>
-              </a:solidFill>
-              <a:latin typeface="Consolas" panose="020B0609020204030204" pitchFamily="49" charset="0"/>
-            </a:endParaRPr>
-          </a:p>
-          <a:p>
-            <a:r>
-              <a:rPr lang="en-US" sz="3200" b="1" smtClean="0">
-                <a:solidFill>
-                  <a:srgbClr val="808080"/>
-                </a:solidFill>
-                <a:latin typeface="Consolas" panose="020B0609020204030204" pitchFamily="49" charset="0"/>
-              </a:rPr>
-              <a:t>  &lt;</a:t>
-            </a:r>
-            <a:r>
-              <a:rPr lang="en-US" sz="3200" b="1">
-                <a:solidFill>
-                  <a:srgbClr val="569CD6"/>
-                </a:solidFill>
-                <a:latin typeface="Consolas" panose="020B0609020204030204" pitchFamily="49" charset="0"/>
-              </a:rPr>
-              <a:t>p</a:t>
-            </a:r>
-            <a:r>
-              <a:rPr lang="en-US" sz="3200" b="1">
-                <a:solidFill>
-                  <a:srgbClr val="808080"/>
-                </a:solidFill>
-                <a:latin typeface="Consolas" panose="020B0609020204030204" pitchFamily="49" charset="0"/>
-              </a:rPr>
-              <a:t>&gt;</a:t>
-            </a:r>
-            <a:r>
-              <a:rPr lang="en-US" sz="3200" b="1">
-                <a:solidFill>
-                  <a:srgbClr val="D4D4D4"/>
-                </a:solidFill>
-                <a:latin typeface="Consolas" panose="020B0609020204030204" pitchFamily="49" charset="0"/>
-              </a:rPr>
-              <a:t>This is some text.</a:t>
-            </a:r>
-            <a:r>
-              <a:rPr lang="en-US" sz="3200" b="1">
-                <a:solidFill>
-                  <a:srgbClr val="808080"/>
-                </a:solidFill>
-                <a:latin typeface="Consolas" panose="020B0609020204030204" pitchFamily="49" charset="0"/>
-              </a:rPr>
-              <a:t>&lt;/</a:t>
-            </a:r>
-            <a:r>
-              <a:rPr lang="en-US" sz="3200" b="1">
-                <a:solidFill>
-                  <a:srgbClr val="569CD6"/>
-                </a:solidFill>
-                <a:latin typeface="Consolas" panose="020B0609020204030204" pitchFamily="49" charset="0"/>
-              </a:rPr>
-              <a:t>p</a:t>
-            </a:r>
-            <a:r>
-              <a:rPr lang="en-US" sz="3200" b="1">
-                <a:solidFill>
-                  <a:srgbClr val="808080"/>
-                </a:solidFill>
-                <a:latin typeface="Consolas" panose="020B0609020204030204" pitchFamily="49" charset="0"/>
-              </a:rPr>
-              <a:t>&gt;</a:t>
-            </a:r>
-            <a:r>
-              <a:rPr lang="en-US" sz="3200" b="1">
-                <a:solidFill>
-                  <a:srgbClr val="D4D4D4"/>
-                </a:solidFill>
-                <a:latin typeface="Consolas" panose="020B0609020204030204" pitchFamily="49" charset="0"/>
-              </a:rPr>
-              <a:t> </a:t>
-            </a:r>
-          </a:p>
-          <a:p>
-            <a:r>
-              <a:rPr lang="en-US" sz="3200" b="1">
-                <a:solidFill>
-                  <a:srgbClr val="808080"/>
-                </a:solidFill>
-                <a:latin typeface="Consolas" panose="020B0609020204030204" pitchFamily="49" charset="0"/>
-              </a:rPr>
-              <a:t>&lt;/</a:t>
-            </a:r>
-            <a:r>
-              <a:rPr lang="en-US" sz="3200" b="1">
-                <a:solidFill>
-                  <a:srgbClr val="569CD6"/>
-                </a:solidFill>
-                <a:latin typeface="Consolas" panose="020B0609020204030204" pitchFamily="49" charset="0"/>
-              </a:rPr>
-              <a:t>div</a:t>
-            </a:r>
-            <a:r>
-              <a:rPr lang="en-US" sz="3200" b="1">
-                <a:solidFill>
-                  <a:srgbClr val="808080"/>
-                </a:solidFill>
-                <a:latin typeface="Consolas" panose="020B0609020204030204" pitchFamily="49" charset="0"/>
-              </a:rPr>
-              <a:t>&gt;</a:t>
-            </a:r>
-            <a:endParaRPr lang="en-US" sz="3200" b="1">
-              <a:solidFill>
-                <a:srgbClr val="D4D4D4"/>
-              </a:solidFill>
-              <a:latin typeface="Consolas" panose="020B0609020204030204" pitchFamily="49" charset="0"/>
-            </a:endParaRPr>
-          </a:p>
-          <a:p>
-            <a:endParaRPr lang="da-DK" sz="1400" b="1" smtClean="0">
-              <a:solidFill>
-                <a:srgbClr val="D4D4D4"/>
-              </a:solidFill>
-              <a:latin typeface="Consolas" panose="020B0609020204030204" pitchFamily="49" charset="0"/>
-            </a:endParaRPr>
-          </a:p>
-          <a:p>
-            <a:endParaRPr lang="da-DK" sz="1200"/>
-          </a:p>
-        </p:txBody>
-      </p:sp>
-    </p:spTree>
-    <p:extLst>
-      <p:ext uri="{BB962C8B-B14F-4D97-AF65-F5344CB8AC3E}">
-        <p14:creationId xmlns:p14="http://schemas.microsoft.com/office/powerpoint/2010/main" val="1814157107"/>
-      </p:ext>
-    </p:extLst>
-  </p:cSld>
-  <p:clrMapOvr>
-    <a:masterClrMapping/>
-  </p:clrMapOvr>
-  <p:timing>
-    <p:tnLst>
-      <p:par>
-        <p:cTn id="1" dur="indefinite" restart="never" nodeType="tmRoot"/>
-      </p:par>
-    </p:tnLst>
-  </p:timing>
-</p:sld>
-</file>
-
-<file path=ppt/slides/slide11.xml><?xml version="1.0" encoding="utf-8"?>
-<p:sld xmlns:a="http://schemas.openxmlformats.org/drawingml/2006/main" xmlns:r="http://schemas.openxmlformats.org/officeDocument/2006/relationships" xmlns:p="http://schemas.openxmlformats.org/presentationml/2006/main">
-  <p:cSld>
-    <p:spTree>
-      <p:nvGrpSpPr>
-        <p:cNvPr id="1" name=""/>
-        <p:cNvGrpSpPr/>
-        <p:nvPr/>
-      </p:nvGrpSpPr>
-      <p:grpSpPr>
-        <a:xfrm>
-          <a:off x="0" y="0"/>
-          <a:ext cx="0" cy="0"/>
-          <a:chOff x="0" y="0"/>
-          <a:chExt cx="0" cy="0"/>
-        </a:xfrm>
-      </p:grpSpPr>
-      <p:sp>
-        <p:nvSpPr>
-          <p:cNvPr id="2" name="Titel 1"/>
-          <p:cNvSpPr>
-            <a:spLocks noGrp="1"/>
-          </p:cNvSpPr>
-          <p:nvPr>
-            <p:ph type="title"/>
-          </p:nvPr>
-        </p:nvSpPr>
-        <p:spPr/>
-        <p:txBody>
-          <a:bodyPr/>
-          <a:lstStyle/>
-          <a:p>
-            <a:r>
-              <a:rPr lang="da-DK" b="1"/>
-              <a:t>Bootstrap, styling with classes</a:t>
-            </a:r>
-            <a:endParaRPr lang="da-DK" b="1"/>
-          </a:p>
-        </p:txBody>
-      </p:sp>
-      <p:sp>
-        <p:nvSpPr>
-          <p:cNvPr id="5" name="Tekstfelt 4"/>
-          <p:cNvSpPr txBox="1"/>
-          <p:nvPr/>
-        </p:nvSpPr>
-        <p:spPr>
-          <a:xfrm>
-            <a:off x="920578" y="1797907"/>
-            <a:ext cx="10886303" cy="2462213"/>
-          </a:xfrm>
-          <a:prstGeom prst="rect">
-            <a:avLst/>
-          </a:prstGeom>
-          <a:noFill/>
-        </p:spPr>
-        <p:txBody>
-          <a:bodyPr wrap="square" rtlCol="0">
-            <a:spAutoFit/>
-          </a:bodyPr>
-          <a:lstStyle/>
-          <a:p>
-            <a:r>
-              <a:rPr lang="en-US" sz="3200" b="1" smtClean="0">
-                <a:solidFill>
-                  <a:srgbClr val="808080"/>
-                </a:solidFill>
-                <a:latin typeface="Consolas" panose="020B0609020204030204" pitchFamily="49" charset="0"/>
-              </a:rPr>
-              <a:t>&lt;</a:t>
-            </a:r>
-            <a:r>
-              <a:rPr lang="en-US" sz="3200" b="1">
-                <a:solidFill>
-                  <a:srgbClr val="569CD6"/>
-                </a:solidFill>
-                <a:latin typeface="Consolas" panose="020B0609020204030204" pitchFamily="49" charset="0"/>
-              </a:rPr>
-              <a:t>div</a:t>
-            </a:r>
-            <a:r>
-              <a:rPr lang="en-US" sz="3200" b="1">
-                <a:solidFill>
-                  <a:srgbClr val="D4D4D4"/>
-                </a:solidFill>
-                <a:latin typeface="Consolas" panose="020B0609020204030204" pitchFamily="49" charset="0"/>
-              </a:rPr>
-              <a:t> </a:t>
-            </a:r>
-            <a:r>
-              <a:rPr lang="en-US" sz="3200" b="1">
-                <a:solidFill>
-                  <a:srgbClr val="9CDCFE"/>
-                </a:solidFill>
-                <a:latin typeface="Consolas" panose="020B0609020204030204" pitchFamily="49" charset="0"/>
-              </a:rPr>
-              <a:t>class</a:t>
-            </a:r>
-            <a:r>
-              <a:rPr lang="en-US" sz="3200" b="1">
-                <a:solidFill>
-                  <a:srgbClr val="D4D4D4"/>
-                </a:solidFill>
-                <a:latin typeface="Consolas" panose="020B0609020204030204" pitchFamily="49" charset="0"/>
-              </a:rPr>
-              <a:t>=</a:t>
-            </a:r>
-            <a:r>
-              <a:rPr lang="en-US" sz="3200" b="1">
-                <a:solidFill>
-                  <a:srgbClr val="CE9178"/>
-                </a:solidFill>
-                <a:latin typeface="Consolas" panose="020B0609020204030204" pitchFamily="49" charset="0"/>
-              </a:rPr>
-              <a:t>"container"</a:t>
-            </a:r>
-            <a:r>
-              <a:rPr lang="en-US" sz="3200" b="1">
-                <a:solidFill>
-                  <a:srgbClr val="808080"/>
-                </a:solidFill>
-                <a:latin typeface="Consolas" panose="020B0609020204030204" pitchFamily="49" charset="0"/>
-              </a:rPr>
-              <a:t>&gt;</a:t>
-            </a:r>
-            <a:r>
-              <a:rPr lang="en-US" sz="3200" b="1">
-                <a:solidFill>
-                  <a:srgbClr val="D4D4D4"/>
-                </a:solidFill>
-                <a:latin typeface="Consolas" panose="020B0609020204030204" pitchFamily="49" charset="0"/>
-              </a:rPr>
-              <a:t> </a:t>
-            </a:r>
-          </a:p>
-          <a:p>
-            <a:r>
-              <a:rPr lang="en-US" sz="3200" b="1">
-                <a:solidFill>
-                  <a:srgbClr val="808080"/>
-                </a:solidFill>
-                <a:latin typeface="Consolas" panose="020B0609020204030204" pitchFamily="49" charset="0"/>
-              </a:rPr>
-              <a:t> </a:t>
-            </a:r>
-            <a:r>
-              <a:rPr lang="en-US" sz="3200" b="1" smtClean="0">
-                <a:solidFill>
-                  <a:srgbClr val="808080"/>
-                </a:solidFill>
-                <a:latin typeface="Consolas" panose="020B0609020204030204" pitchFamily="49" charset="0"/>
-              </a:rPr>
-              <a:t> &lt;</a:t>
-            </a:r>
-            <a:r>
-              <a:rPr lang="en-US" sz="3200" b="1">
-                <a:solidFill>
-                  <a:srgbClr val="569CD6"/>
-                </a:solidFill>
-                <a:latin typeface="Consolas" panose="020B0609020204030204" pitchFamily="49" charset="0"/>
-              </a:rPr>
-              <a:t>h1</a:t>
-            </a:r>
-            <a:r>
-              <a:rPr lang="en-US" sz="3200" b="1">
-                <a:solidFill>
-                  <a:srgbClr val="808080"/>
-                </a:solidFill>
-                <a:latin typeface="Consolas" panose="020B0609020204030204" pitchFamily="49" charset="0"/>
-              </a:rPr>
-              <a:t>&gt;</a:t>
-            </a:r>
-            <a:r>
-              <a:rPr lang="en-US" sz="3200" b="1">
-                <a:solidFill>
-                  <a:srgbClr val="D4D4D4"/>
-                </a:solidFill>
-                <a:latin typeface="Consolas" panose="020B0609020204030204" pitchFamily="49" charset="0"/>
-              </a:rPr>
-              <a:t>This is a Level 1 Heading</a:t>
-            </a:r>
-            <a:r>
-              <a:rPr lang="en-US" sz="3200" b="1">
-                <a:solidFill>
-                  <a:srgbClr val="808080"/>
-                </a:solidFill>
-                <a:latin typeface="Consolas" panose="020B0609020204030204" pitchFamily="49" charset="0"/>
-              </a:rPr>
-              <a:t>&lt;/</a:t>
-            </a:r>
-            <a:r>
-              <a:rPr lang="en-US" sz="3200" b="1">
-                <a:solidFill>
-                  <a:srgbClr val="569CD6"/>
-                </a:solidFill>
-                <a:latin typeface="Consolas" panose="020B0609020204030204" pitchFamily="49" charset="0"/>
-              </a:rPr>
-              <a:t>h1</a:t>
-            </a:r>
-            <a:r>
-              <a:rPr lang="en-US" sz="3200" b="1">
-                <a:solidFill>
-                  <a:srgbClr val="808080"/>
-                </a:solidFill>
-                <a:latin typeface="Consolas" panose="020B0609020204030204" pitchFamily="49" charset="0"/>
-              </a:rPr>
-              <a:t>&gt;</a:t>
-            </a:r>
-            <a:endParaRPr lang="en-US" sz="3200" b="1">
-              <a:solidFill>
-                <a:srgbClr val="D4D4D4"/>
-              </a:solidFill>
-              <a:latin typeface="Consolas" panose="020B0609020204030204" pitchFamily="49" charset="0"/>
-            </a:endParaRPr>
-          </a:p>
-          <a:p>
-            <a:r>
-              <a:rPr lang="en-US" sz="3200" b="1" smtClean="0">
-                <a:solidFill>
-                  <a:srgbClr val="808080"/>
-                </a:solidFill>
-                <a:latin typeface="Consolas" panose="020B0609020204030204" pitchFamily="49" charset="0"/>
-              </a:rPr>
-              <a:t>  &lt;</a:t>
-            </a:r>
-            <a:r>
-              <a:rPr lang="en-US" sz="3200" b="1">
-                <a:solidFill>
-                  <a:srgbClr val="569CD6"/>
-                </a:solidFill>
-                <a:latin typeface="Consolas" panose="020B0609020204030204" pitchFamily="49" charset="0"/>
-              </a:rPr>
-              <a:t>p</a:t>
-            </a:r>
-            <a:r>
-              <a:rPr lang="en-US" sz="3200" b="1">
-                <a:solidFill>
-                  <a:srgbClr val="808080"/>
-                </a:solidFill>
-                <a:latin typeface="Consolas" panose="020B0609020204030204" pitchFamily="49" charset="0"/>
-              </a:rPr>
-              <a:t>&gt;</a:t>
-            </a:r>
-            <a:r>
-              <a:rPr lang="en-US" sz="3200" b="1">
-                <a:solidFill>
-                  <a:srgbClr val="D4D4D4"/>
-                </a:solidFill>
-                <a:latin typeface="Consolas" panose="020B0609020204030204" pitchFamily="49" charset="0"/>
-              </a:rPr>
-              <a:t>This is some text.</a:t>
-            </a:r>
-            <a:r>
-              <a:rPr lang="en-US" sz="3200" b="1">
-                <a:solidFill>
-                  <a:srgbClr val="808080"/>
-                </a:solidFill>
-                <a:latin typeface="Consolas" panose="020B0609020204030204" pitchFamily="49" charset="0"/>
-              </a:rPr>
-              <a:t>&lt;/</a:t>
-            </a:r>
-            <a:r>
-              <a:rPr lang="en-US" sz="3200" b="1">
-                <a:solidFill>
-                  <a:srgbClr val="569CD6"/>
-                </a:solidFill>
-                <a:latin typeface="Consolas" panose="020B0609020204030204" pitchFamily="49" charset="0"/>
-              </a:rPr>
-              <a:t>p</a:t>
-            </a:r>
-            <a:r>
-              <a:rPr lang="en-US" sz="3200" b="1">
-                <a:solidFill>
-                  <a:srgbClr val="808080"/>
-                </a:solidFill>
-                <a:latin typeface="Consolas" panose="020B0609020204030204" pitchFamily="49" charset="0"/>
-              </a:rPr>
-              <a:t>&gt;</a:t>
-            </a:r>
-            <a:r>
-              <a:rPr lang="en-US" sz="3200" b="1">
-                <a:solidFill>
-                  <a:srgbClr val="D4D4D4"/>
-                </a:solidFill>
-                <a:latin typeface="Consolas" panose="020B0609020204030204" pitchFamily="49" charset="0"/>
-              </a:rPr>
-              <a:t> </a:t>
-            </a:r>
-          </a:p>
-          <a:p>
-            <a:r>
-              <a:rPr lang="en-US" sz="3200" b="1">
-                <a:solidFill>
-                  <a:srgbClr val="808080"/>
-                </a:solidFill>
-                <a:latin typeface="Consolas" panose="020B0609020204030204" pitchFamily="49" charset="0"/>
-              </a:rPr>
-              <a:t>&lt;/</a:t>
-            </a:r>
-            <a:r>
-              <a:rPr lang="en-US" sz="3200" b="1">
-                <a:solidFill>
-                  <a:srgbClr val="569CD6"/>
-                </a:solidFill>
-                <a:latin typeface="Consolas" panose="020B0609020204030204" pitchFamily="49" charset="0"/>
-              </a:rPr>
-              <a:t>div</a:t>
-            </a:r>
-            <a:r>
-              <a:rPr lang="en-US" sz="3200" b="1">
-                <a:solidFill>
-                  <a:srgbClr val="808080"/>
-                </a:solidFill>
-                <a:latin typeface="Consolas" panose="020B0609020204030204" pitchFamily="49" charset="0"/>
-              </a:rPr>
-              <a:t>&gt;</a:t>
-            </a:r>
-            <a:endParaRPr lang="en-US" sz="3200" b="1">
-              <a:solidFill>
-                <a:srgbClr val="D4D4D4"/>
-              </a:solidFill>
-              <a:latin typeface="Consolas" panose="020B0609020204030204" pitchFamily="49" charset="0"/>
-            </a:endParaRPr>
-          </a:p>
-          <a:p>
-            <a:endParaRPr lang="da-DK" sz="1400" b="1" smtClean="0">
-              <a:solidFill>
-                <a:srgbClr val="D4D4D4"/>
-              </a:solidFill>
-              <a:latin typeface="Consolas" panose="020B0609020204030204" pitchFamily="49" charset="0"/>
-            </a:endParaRPr>
-          </a:p>
-          <a:p>
-            <a:endParaRPr lang="da-DK" sz="1200"/>
-          </a:p>
-        </p:txBody>
-      </p:sp>
-    </p:spTree>
-    <p:extLst>
-      <p:ext uri="{BB962C8B-B14F-4D97-AF65-F5344CB8AC3E}">
-        <p14:creationId xmlns:p14="http://schemas.microsoft.com/office/powerpoint/2010/main" val="298550823"/>
-      </p:ext>
-    </p:extLst>
-  </p:cSld>
-  <p:clrMapOvr>
-    <a:masterClrMapping/>
-  </p:clrMapOvr>
-  <mc:AlternateContent xmlns:mc="http://schemas.openxmlformats.org/markup-compatibility/2006">
-    <mc:Choice xmlns:p14="http://schemas.microsoft.com/office/powerpoint/2010/main" Requires="p14">
-      <p:transition spd="med" p14:dur="700">
-        <p:fade/>
-      </p:transition>
-    </mc:Choice>
-    <mc:Fallback>
-      <p:transition spd="med">
-        <p:fade/>
-      </p:transition>
-    </mc:Fallback>
-  </mc:AlternateContent>
-  <p:timing>
-    <p:tnLst>
-      <p:par>
-        <p:cTn id="1" dur="indefinite" restart="never" nodeType="tmRoot"/>
-      </p:par>
-    </p:tnLst>
-  </p:timing>
-</p:sld>
-</file>
-
-<file path=ppt/slides/slide12.xml><?xml version="1.0" encoding="utf-8"?>
-<p:sld xmlns:a="http://schemas.openxmlformats.org/drawingml/2006/main" xmlns:r="http://schemas.openxmlformats.org/officeDocument/2006/relationships" xmlns:p="http://schemas.openxmlformats.org/presentationml/2006/main">
-  <p:cSld>
-    <p:spTree>
-      <p:nvGrpSpPr>
-        <p:cNvPr id="1" name=""/>
-        <p:cNvGrpSpPr/>
-        <p:nvPr/>
-      </p:nvGrpSpPr>
-      <p:grpSpPr>
-        <a:xfrm>
-          <a:off x="0" y="0"/>
-          <a:ext cx="0" cy="0"/>
-          <a:chOff x="0" y="0"/>
-          <a:chExt cx="0" cy="0"/>
-        </a:xfrm>
-      </p:grpSpPr>
-      <p:sp>
-        <p:nvSpPr>
-          <p:cNvPr id="2" name="Titel 1"/>
-          <p:cNvSpPr>
-            <a:spLocks noGrp="1"/>
-          </p:cNvSpPr>
-          <p:nvPr>
-            <p:ph type="title"/>
-          </p:nvPr>
-        </p:nvSpPr>
-        <p:spPr/>
-        <p:txBody>
-          <a:bodyPr/>
-          <a:lstStyle/>
-          <a:p>
-            <a:r>
               <a:rPr lang="da-DK" b="1" smtClean="0"/>
               <a:t>Bootstrap, styling overview</a:t>
             </a:r>
@@ -3823,7 +3126,7 @@
         <p:spPr>
           <a:xfrm>
             <a:off x="823784" y="1825625"/>
-            <a:ext cx="8870092" cy="4587532"/>
+            <a:ext cx="8443784" cy="4587532"/>
           </a:xfrm>
         </p:spPr>
         <p:txBody>
@@ -3868,7 +3171,15 @@
             </a:r>
             <a:r>
               <a:rPr lang="da-DK" sz="3200" smtClean="0"/>
-              <a:t>(grids, flexboxes)</a:t>
+              <a:t>(grids, </a:t>
+            </a:r>
+            <a:r>
+              <a:rPr lang="da-DK" sz="3200" smtClean="0"/>
+              <a:t>rows, columns, flex-boxes</a:t>
+            </a:r>
+            <a:r>
+              <a:rPr lang="da-DK" sz="3200" smtClean="0"/>
+              <a:t>)</a:t>
             </a:r>
           </a:p>
           <a:p>
@@ -3932,7 +3243,7 @@
 </p:sld>
 </file>
 
-<file path=ppt/slides/slide13.xml><?xml version="1.0" encoding="utf-8"?>
+<file path=ppt/slides/slide11.xml><?xml version="1.0" encoding="utf-8"?>
 <p:sld xmlns:a="http://schemas.openxmlformats.org/drawingml/2006/main" xmlns:r="http://schemas.openxmlformats.org/officeDocument/2006/relationships" xmlns:p="http://schemas.openxmlformats.org/presentationml/2006/main">
   <p:cSld>
     <p:spTree>
@@ -4149,7 +3460,7 @@
 </p:sld>
 </file>
 
-<file path=ppt/slides/slide14.xml><?xml version="1.0" encoding="utf-8"?>
+<file path=ppt/slides/slide12.xml><?xml version="1.0" encoding="utf-8"?>
 <p:sld xmlns:a="http://schemas.openxmlformats.org/drawingml/2006/main" xmlns:r="http://schemas.openxmlformats.org/officeDocument/2006/relationships" xmlns:p="http://schemas.openxmlformats.org/presentationml/2006/main">
   <p:cSld>
     <p:spTree>
@@ -4235,11 +3546,7 @@
             </a:r>
             <a:r>
               <a:rPr lang="da-DK" sz="2800"/>
-              <a:t>: this is </a:t>
-            </a:r>
-            <a:r>
-              <a:rPr lang="da-DK" sz="2800"/>
-              <a:t>the </a:t>
+              <a:t>: this is the </a:t>
             </a:r>
             <a:r>
               <a:rPr lang="da-DK" sz="2800" smtClean="0"/>
@@ -4261,11 +3568,7 @@
             <a:pPr lvl="1"/>
             <a:r>
               <a:rPr lang="da-DK" sz="2800"/>
-              <a:t>Also </a:t>
-            </a:r>
-            <a:r>
-              <a:rPr lang="da-DK" sz="2800"/>
-              <a:t>see </a:t>
+              <a:t>Also see </a:t>
             </a:r>
             <a:endParaRPr lang="da-DK" sz="2800" smtClean="0"/>
           </a:p>
@@ -4329,6 +3632,252 @@
     <p:extLst>
       <p:ext uri="{BB962C8B-B14F-4D97-AF65-F5344CB8AC3E}">
         <p14:creationId xmlns:p14="http://schemas.microsoft.com/office/powerpoint/2010/main" val="489007422"/>
+      </p:ext>
+    </p:extLst>
+  </p:cSld>
+  <p:clrMapOvr>
+    <a:masterClrMapping/>
+  </p:clrMapOvr>
+  <p:timing>
+    <p:tnLst>
+      <p:par>
+        <p:cTn id="1" dur="indefinite" restart="never" nodeType="tmRoot"/>
+      </p:par>
+    </p:tnLst>
+  </p:timing>
+</p:sld>
+</file>
+
+<file path=ppt/slides/slide13.xml><?xml version="1.0" encoding="utf-8"?>
+<p:sld xmlns:a="http://schemas.openxmlformats.org/drawingml/2006/main" xmlns:r="http://schemas.openxmlformats.org/officeDocument/2006/relationships" xmlns:p="http://schemas.openxmlformats.org/presentationml/2006/main">
+  <p:cSld>
+    <p:spTree>
+      <p:nvGrpSpPr>
+        <p:cNvPr id="1" name=""/>
+        <p:cNvGrpSpPr/>
+        <p:nvPr/>
+      </p:nvGrpSpPr>
+      <p:grpSpPr>
+        <a:xfrm>
+          <a:off x="0" y="0"/>
+          <a:ext cx="0" cy="0"/>
+          <a:chOff x="0" y="0"/>
+          <a:chExt cx="0" cy="0"/>
+        </a:xfrm>
+      </p:grpSpPr>
+      <p:sp>
+        <p:nvSpPr>
+          <p:cNvPr id="2" name="Titel 1"/>
+          <p:cNvSpPr>
+            <a:spLocks noGrp="1"/>
+          </p:cNvSpPr>
+          <p:nvPr>
+            <p:ph type="title"/>
+          </p:nvPr>
+        </p:nvSpPr>
+        <p:spPr/>
+        <p:txBody>
+          <a:bodyPr/>
+          <a:lstStyle/>
+          <a:p>
+            <a:r>
+              <a:rPr lang="da-DK" b="1" smtClean="0"/>
+              <a:t>Bootstrap</a:t>
+            </a:r>
+            <a:r>
+              <a:rPr lang="da-DK" b="1"/>
+              <a:t> </a:t>
+            </a:r>
+            <a:r>
+              <a:rPr lang="da-DK" b="1" smtClean="0"/>
+              <a:t>– Grid (from GetBootstrap)</a:t>
+            </a:r>
+            <a:endParaRPr lang="da-DK" b="1"/>
+          </a:p>
+        </p:txBody>
+      </p:sp>
+      <p:sp>
+        <p:nvSpPr>
+          <p:cNvPr id="3" name="Pladsholder til indhold 2"/>
+          <p:cNvSpPr>
+            <a:spLocks noGrp="1"/>
+          </p:cNvSpPr>
+          <p:nvPr>
+            <p:ph idx="1"/>
+          </p:nvPr>
+        </p:nvSpPr>
+        <p:spPr>
+          <a:xfrm>
+            <a:off x="823784" y="1825625"/>
+            <a:ext cx="7955692" cy="4587532"/>
+          </a:xfrm>
+        </p:spPr>
+        <p:txBody>
+          <a:bodyPr>
+            <a:normAutofit/>
+          </a:bodyPr>
+          <a:lstStyle/>
+          <a:p>
+            <a:pPr lvl="1"/>
+            <a:r>
+              <a:rPr lang="en-US" sz="1200" b="1"/>
+              <a:t>Containers</a:t>
+            </a:r>
+            <a:r>
+              <a:rPr lang="en-US" sz="1200"/>
+              <a:t> provide a means to center and horizontally pad your site’s contents. Use </a:t>
+            </a:r>
+            <a:r>
+              <a:rPr lang="en-US" sz="1200" b="1"/>
+              <a:t>.container </a:t>
+            </a:r>
+            <a:r>
+              <a:rPr lang="en-US" sz="1200"/>
+              <a:t>for a responsive pixel width or </a:t>
+            </a:r>
+            <a:r>
+              <a:rPr lang="en-US" sz="1200" b="1"/>
+              <a:t>.container-fluid </a:t>
+            </a:r>
+            <a:r>
+              <a:rPr lang="en-US" sz="1200"/>
+              <a:t>for width: 100% across all viewport and device sizes.</a:t>
+            </a:r>
+          </a:p>
+          <a:p>
+            <a:pPr lvl="1"/>
+            <a:r>
+              <a:rPr lang="en-US" sz="1200" b="1"/>
+              <a:t>Rows are wrappers for columns</a:t>
+            </a:r>
+            <a:r>
+              <a:rPr lang="en-US" sz="1200"/>
+              <a:t>. Each column has horizontal padding (called a gutter) for controlling the space between them. This padding is then counteracted on the rows with negative margins. This way, all the content in your columns is visually aligned down the left side.</a:t>
+            </a:r>
+          </a:p>
+          <a:p>
+            <a:pPr lvl="1"/>
+            <a:r>
+              <a:rPr lang="en-US" sz="1200"/>
+              <a:t>In a grid layout, </a:t>
+            </a:r>
+            <a:r>
+              <a:rPr lang="en-US" sz="1200" b="1"/>
+              <a:t>content must be placed within columns</a:t>
+            </a:r>
+            <a:r>
+              <a:rPr lang="en-US" sz="1200"/>
+              <a:t> and </a:t>
+            </a:r>
+            <a:r>
+              <a:rPr lang="en-US" sz="1200" b="1"/>
+              <a:t>only columns may be immediate children of rows</a:t>
+            </a:r>
+            <a:r>
+              <a:rPr lang="en-US" sz="1200"/>
+              <a:t>.</a:t>
+            </a:r>
+          </a:p>
+          <a:p>
+            <a:pPr lvl="1"/>
+            <a:r>
+              <a:rPr lang="en-US" sz="1200"/>
+              <a:t>Thanks to flexbox, </a:t>
+            </a:r>
+            <a:r>
+              <a:rPr lang="en-US" sz="1200" b="1"/>
+              <a:t>grid columns without a specified width will automatically layout as equal width columns</a:t>
+            </a:r>
+            <a:r>
+              <a:rPr lang="en-US" sz="1200"/>
+              <a:t>. For example, four instances of .col-sm will each automatically be 25% wide from the small breakpoint and up. See the auto-layout columns section for more examples.</a:t>
+            </a:r>
+          </a:p>
+          <a:p>
+            <a:pPr lvl="1"/>
+            <a:r>
+              <a:rPr lang="en-US" sz="1200" b="1"/>
+              <a:t>Column classes indicate the number of columns you’d like to use out of the possible 12 per row</a:t>
+            </a:r>
+            <a:r>
+              <a:rPr lang="en-US" sz="1200"/>
+              <a:t>. So, if you want three equal-width columns across, you can use .col-4.</a:t>
+            </a:r>
+          </a:p>
+          <a:p>
+            <a:pPr lvl="1"/>
+            <a:r>
+              <a:rPr lang="en-US" sz="1200" b="1"/>
+              <a:t>Column widths are set in percentages</a:t>
+            </a:r>
+            <a:r>
+              <a:rPr lang="en-US" sz="1200"/>
+              <a:t>, so they’re always fluid and sized relative to their parent element.</a:t>
+            </a:r>
+          </a:p>
+          <a:p>
+            <a:pPr lvl="1"/>
+            <a:r>
+              <a:rPr lang="en-US" sz="1200"/>
+              <a:t>Columns have horizontal padding to create the gutters between individual columns, however, you can remove the margin from rows and padding from columns with .no-gutters on the .row.</a:t>
+            </a:r>
+          </a:p>
+          <a:p>
+            <a:pPr lvl="1"/>
+            <a:r>
+              <a:rPr lang="en-US" sz="1200" b="1"/>
+              <a:t>To make the grid responsive, there are five grid breakpoints</a:t>
+            </a:r>
+            <a:r>
+              <a:rPr lang="en-US" sz="1200"/>
+              <a:t>, one for each responsive breakpoint: all breakpoints (extra small), small, medium, large, and extra large.</a:t>
+            </a:r>
+          </a:p>
+          <a:p>
+            <a:pPr lvl="1"/>
+            <a:r>
+              <a:rPr lang="en-US" sz="1200"/>
+              <a:t>Grid breakpoints are based on minimum width media queries, meaning they apply to that one breakpoint and all those above it (e.g., .col-sm-4 applies to small, medium, large, and extra large devices, but not the first xs breakpoint).</a:t>
+            </a:r>
+          </a:p>
+          <a:p>
+            <a:pPr lvl="1"/>
+            <a:r>
+              <a:rPr lang="en-US" sz="1200"/>
+              <a:t>You can use predefined grid classes (like .col-4) or Sass mixins for more semantic markup.</a:t>
+            </a:r>
+            <a:endParaRPr lang="da-DK" sz="1200"/>
+          </a:p>
+        </p:txBody>
+      </p:sp>
+      <p:pic>
+        <p:nvPicPr>
+          <p:cNvPr id="4" name="Billede 3"/>
+          <p:cNvPicPr>
+            <a:picLocks noChangeAspect="1"/>
+          </p:cNvPicPr>
+          <p:nvPr/>
+        </p:nvPicPr>
+        <p:blipFill>
+          <a:blip r:embed="rId2"/>
+          <a:stretch>
+            <a:fillRect/>
+          </a:stretch>
+        </p:blipFill>
+        <p:spPr>
+          <a:xfrm>
+            <a:off x="9693876" y="2434281"/>
+            <a:ext cx="2059054" cy="1767016"/>
+          </a:xfrm>
+          <a:prstGeom prst="rect">
+            <a:avLst/>
+          </a:prstGeom>
+        </p:spPr>
+      </p:pic>
+    </p:spTree>
+    <p:extLst>
+      <p:ext uri="{BB962C8B-B14F-4D97-AF65-F5344CB8AC3E}">
+        <p14:creationId xmlns:p14="http://schemas.microsoft.com/office/powerpoint/2010/main" val="1990933463"/>
       </p:ext>
     </p:extLst>
   </p:cSld>
@@ -4666,13 +4215,13 @@
   <p:clrMapOvr>
     <a:masterClrMapping/>
   </p:clrMapOvr>
-  <mc:AlternateContent xmlns:mc="http://schemas.openxmlformats.org/markup-compatibility/2006">
-    <mc:Choice xmlns:p14="http://schemas.microsoft.com/office/powerpoint/2010/main" Requires="p14">
+  <mc:AlternateContent xmlns:mc="http://schemas.openxmlformats.org/markup-compatibility/2006" xmlns:p14="http://schemas.microsoft.com/office/powerpoint/2010/main">
+    <mc:Choice Requires="p14">
       <p:transition spd="med" p14:dur="700">
         <p:fade/>
       </p:transition>
     </mc:Choice>
-    <mc:Fallback>
+    <mc:Fallback xmlns="">
       <p:transition spd="med">
         <p:fade/>
       </p:transition>
@@ -4768,11 +4317,7 @@
             </a:r>
             <a:r>
               <a:rPr lang="da-DK" sz="2800"/>
-              <a:t>part of HTML document, include a reference </a:t>
-            </a:r>
-            <a:r>
-              <a:rPr lang="da-DK" sz="2800"/>
-              <a:t>to </a:t>
+              <a:t>part of HTML document, include a reference to </a:t>
             </a:r>
             <a:r>
               <a:rPr lang="da-DK" sz="2800" smtClean="0"/>
@@ -4876,55 +4421,118 @@
           <a:lstStyle/>
           <a:p>
             <a:r>
-              <a:rPr lang="da-DK" b="1" smtClean="0"/>
+              <a:rPr lang="da-DK" b="1"/>
               <a:t>Getting started with Bootstrap</a:t>
             </a:r>
-            <a:endParaRPr lang="da-DK" b="1"/>
-          </a:p>
-        </p:txBody>
-      </p:sp>
-      <p:sp>
-        <p:nvSpPr>
-          <p:cNvPr id="5" name="Tekstfelt 4"/>
-          <p:cNvSpPr txBox="1"/>
-          <p:nvPr/>
-        </p:nvSpPr>
-        <p:spPr>
+            <a:endParaRPr lang="da-DK"/>
+          </a:p>
+        </p:txBody>
+      </p:sp>
+      <p:sp>
+        <p:nvSpPr>
+          <p:cNvPr id="4" name="Rectangle 1"/>
+          <p:cNvSpPr>
+            <a:spLocks noGrp="1" noChangeArrowheads="1"/>
+          </p:cNvSpPr>
+          <p:nvPr>
+            <p:ph idx="1"/>
+          </p:nvPr>
+        </p:nvSpPr>
+        <p:spPr bwMode="auto">
           <a:xfrm>
-            <a:off x="920578" y="1797907"/>
-            <a:ext cx="10886303" cy="2215991"/>
+            <a:off x="838200" y="2345457"/>
+            <a:ext cx="9646508" cy="3311676"/>
           </a:xfrm>
           <a:prstGeom prst="rect">
             <a:avLst/>
           </a:prstGeom>
           <a:noFill/>
+          <a:ln>
+            <a:noFill/>
+          </a:ln>
+          <a:effectLst/>
+          <a:extLst>
+            <a:ext uri="{909E8E84-426E-40DD-AFC4-6F175D3DCCD1}">
+              <a14:hiddenFill xmlns:a14="http://schemas.microsoft.com/office/drawing/2010/main">
+                <a:solidFill>
+                  <a:schemeClr val="accent1"/>
+                </a:solidFill>
+              </a14:hiddenFill>
+            </a:ext>
+            <a:ext uri="{91240B29-F687-4F45-9708-019B960494DF}">
+              <a14:hiddenLine xmlns:a14="http://schemas.microsoft.com/office/drawing/2010/main" w="9525">
+                <a:solidFill>
+                  <a:schemeClr val="tx1"/>
+                </a:solidFill>
+                <a:miter lim="800000"/>
+                <a:headEnd/>
+                <a:tailEnd/>
+              </a14:hiddenLine>
+            </a:ext>
+            <a:ext uri="{AF507438-7753-43E0-B8FC-AC1667EBCBE1}">
+              <a14:hiddenEffects xmlns:a14="http://schemas.microsoft.com/office/drawing/2010/main">
+                <a:effectLst>
+                  <a:outerShdw dist="35921" dir="2700000" algn="ctr" rotWithShape="0">
+                    <a:schemeClr val="bg2"/>
+                  </a:outerShdw>
+                </a:effectLst>
+              </a14:hiddenEffects>
+            </a:ext>
+          </a:extLst>
         </p:spPr>
         <p:txBody>
-          <a:bodyPr wrap="square" rtlCol="0">
+          <a:bodyPr vert="horz" wrap="square" lIns="91440" tIns="0" rIns="91440" bIns="0" numCol="1" anchor="ctr" anchorCtr="0" compatLnSpc="1">
+            <a:prstTxWarp prst="textNoShape">
+              <a:avLst/>
+            </a:prstTxWarp>
             <a:spAutoFit/>
           </a:bodyPr>
           <a:lstStyle/>
           <a:p>
-            <a:r>
-              <a:rPr lang="da-DK" sz="1400" b="1">
+            <a:pPr marL="0" indent="0">
+              <a:spcBef>
+                <a:spcPts val="0"/>
+              </a:spcBef>
+              <a:buNone/>
+            </a:pPr>
+            <a:r>
+              <a:rPr lang="da-DK" sz="1200" b="1">
                 <a:solidFill>
                   <a:srgbClr val="808080"/>
                 </a:solidFill>
                 <a:latin typeface="Consolas" panose="020B0609020204030204" pitchFamily="49" charset="0"/>
               </a:rPr>
-              <a:t>&lt;</a:t>
-            </a:r>
-            <a:r>
-              <a:rPr lang="da-DK" sz="1400" b="1">
+              <a:t>&lt;!</a:t>
+            </a:r>
+            <a:r>
+              <a:rPr lang="da-DK" sz="1200" b="1">
                 <a:solidFill>
                   <a:srgbClr val="569CD6"/>
                 </a:solidFill>
                 <a:latin typeface="Consolas" panose="020B0609020204030204" pitchFamily="49" charset="0"/>
               </a:rPr>
-              <a:t>head</a:t>
-            </a:r>
-            <a:r>
-              <a:rPr lang="da-DK" sz="1400" b="1">
+              <a:t>doctype</a:t>
+            </a:r>
+            <a:r>
+              <a:rPr lang="da-DK" sz="1200" b="1">
+                <a:solidFill>
+                  <a:srgbClr val="D4D4D4"/>
+                </a:solidFill>
+                <a:latin typeface="Consolas" panose="020B0609020204030204" pitchFamily="49" charset="0"/>
+              </a:rPr>
+              <a:t> </a:t>
+            </a:r>
+            <a:r>
+              <a:rPr lang="da-DK" sz="1200" b="1">
+                <a:solidFill>
+                  <a:srgbClr val="9CDCFE"/>
+                </a:solidFill>
+                <a:latin typeface="Consolas" panose="020B0609020204030204" pitchFamily="49" charset="0"/>
+              </a:rPr>
+              <a:t>html</a:t>
+            </a:r>
+            <a:r>
+              <a:rPr lang="da-DK" sz="1200" b="1">
                 <a:solidFill>
                   <a:srgbClr val="808080"/>
                 </a:solidFill>
@@ -4932,7 +4540,7 @@
               </a:rPr>
               <a:t>&gt;</a:t>
             </a:r>
-            <a:endParaRPr lang="da-DK" sz="1400" b="1">
+            <a:endParaRPr lang="da-DK" sz="1200" b="1">
               <a:solidFill>
                 <a:srgbClr val="D4D4D4"/>
               </a:solidFill>
@@ -4940,26 +4548,68 @@
             </a:endParaRPr>
           </a:p>
           <a:p>
-            <a:r>
-              <a:rPr lang="da-DK" sz="1400" b="1" smtClean="0">
+            <a:pPr marL="0" indent="0">
+              <a:spcBef>
+                <a:spcPts val="0"/>
+              </a:spcBef>
+              <a:buNone/>
+            </a:pPr>
+            <a:r>
+              <a:rPr lang="da-DK" sz="1200" b="1">
                 <a:solidFill>
                   <a:srgbClr val="808080"/>
                 </a:solidFill>
                 <a:latin typeface="Consolas" panose="020B0609020204030204" pitchFamily="49" charset="0"/>
               </a:rPr>
-              <a:t>  &lt;</a:t>
-            </a:r>
-            <a:r>
-              <a:rPr lang="da-DK" sz="1400" b="1">
+              <a:t>&lt;</a:t>
+            </a:r>
+            <a:r>
+              <a:rPr lang="da-DK" sz="1200" b="1">
                 <a:solidFill>
                   <a:srgbClr val="569CD6"/>
                 </a:solidFill>
                 <a:latin typeface="Consolas" panose="020B0609020204030204" pitchFamily="49" charset="0"/>
               </a:rPr>
-              <a:t>title</a:t>
-            </a:r>
-            <a:r>
-              <a:rPr lang="da-DK" sz="1400" b="1">
+              <a:t>html</a:t>
+            </a:r>
+            <a:r>
+              <a:rPr lang="da-DK" sz="1200" b="1">
+                <a:solidFill>
+                  <a:srgbClr val="D4D4D4"/>
+                </a:solidFill>
+                <a:latin typeface="Consolas" panose="020B0609020204030204" pitchFamily="49" charset="0"/>
+              </a:rPr>
+              <a:t> </a:t>
+            </a:r>
+            <a:r>
+              <a:rPr lang="da-DK" sz="1200" b="1">
+                <a:solidFill>
+                  <a:srgbClr val="9CDCFE"/>
+                </a:solidFill>
+                <a:latin typeface="Consolas" panose="020B0609020204030204" pitchFamily="49" charset="0"/>
+              </a:rPr>
+              <a:t>lang</a:t>
+            </a:r>
+            <a:r>
+              <a:rPr lang="da-DK" sz="1200" b="1">
+                <a:solidFill>
+                  <a:srgbClr val="D4D4D4"/>
+                </a:solidFill>
+                <a:latin typeface="Consolas" panose="020B0609020204030204" pitchFamily="49" charset="0"/>
+              </a:rPr>
+              <a:t>=</a:t>
+            </a:r>
+            <a:r>
+              <a:rPr lang="da-DK" sz="1200" b="1">
+                <a:solidFill>
+                  <a:srgbClr val="CE9178"/>
+                </a:solidFill>
+                <a:latin typeface="Consolas" panose="020B0609020204030204" pitchFamily="49" charset="0"/>
+              </a:rPr>
+              <a:t>"en"</a:t>
+            </a:r>
+            <a:r>
+              <a:rPr lang="da-DK" sz="1200" b="1">
                 <a:solidFill>
                   <a:srgbClr val="808080"/>
                 </a:solidFill>
@@ -4967,43 +4617,7 @@
               </a:rPr>
               <a:t>&gt;</a:t>
             </a:r>
-            <a:r>
-              <a:rPr lang="da-DK" sz="1400" b="1">
-                <a:solidFill>
-                  <a:srgbClr val="D4D4D4"/>
-                </a:solidFill>
-                <a:latin typeface="Consolas" panose="020B0609020204030204" pitchFamily="49" charset="0"/>
-              </a:rPr>
-              <a:t>Bootstrap 4 Empty Template</a:t>
-            </a:r>
-            <a:r>
-              <a:rPr lang="da-DK" sz="1400" b="1">
-                <a:solidFill>
-                  <a:srgbClr val="808080"/>
-                </a:solidFill>
-                <a:latin typeface="Consolas" panose="020B0609020204030204" pitchFamily="49" charset="0"/>
-              </a:rPr>
-              <a:t>&lt;/</a:t>
-            </a:r>
-            <a:r>
-              <a:rPr lang="da-DK" sz="1400" b="1">
-                <a:solidFill>
-                  <a:srgbClr val="569CD6"/>
-                </a:solidFill>
-                <a:latin typeface="Consolas" panose="020B0609020204030204" pitchFamily="49" charset="0"/>
-              </a:rPr>
-              <a:t>title</a:t>
-            </a:r>
-            <a:r>
-              <a:rPr lang="da-DK" sz="1400" b="1">
-                <a:solidFill>
-                  <a:srgbClr val="808080"/>
-                </a:solidFill>
-                <a:latin typeface="Consolas" panose="020B0609020204030204" pitchFamily="49" charset="0"/>
-              </a:rPr>
-              <a:t>&gt;</a:t>
-            </a:r>
-            <a:endParaRPr lang="da-DK" sz="1400" b="1">
+            <a:endParaRPr lang="da-DK" sz="1200" b="1">
               <a:solidFill>
                 <a:srgbClr val="D4D4D4"/>
               </a:solidFill>
@@ -5011,62 +4625,49 @@
             </a:endParaRPr>
           </a:p>
           <a:p>
-            <a:r>
-              <a:rPr lang="da-DK" sz="1400" b="1" smtClean="0">
+            <a:pPr marL="0" indent="0">
+              <a:spcBef>
+                <a:spcPts val="0"/>
+              </a:spcBef>
+              <a:buNone/>
+            </a:pPr>
+            <a:r>
+              <a:rPr lang="da-DK" sz="1200" b="1">
+                <a:solidFill>
+                  <a:srgbClr val="D4D4D4"/>
+                </a:solidFill>
+                <a:latin typeface="Consolas" panose="020B0609020204030204" pitchFamily="49" charset="0"/>
+              </a:rPr>
+              <a:t/>
+            </a:r>
+            <a:br>
+              <a:rPr lang="da-DK" sz="1200" b="1">
+                <a:solidFill>
+                  <a:srgbClr val="D4D4D4"/>
+                </a:solidFill>
+                <a:latin typeface="Consolas" panose="020B0609020204030204" pitchFamily="49" charset="0"/>
+              </a:rPr>
+            </a:br>
+            <a:r>
+              <a:rPr lang="da-DK" sz="1200" b="1">
                 <a:solidFill>
                   <a:srgbClr val="808080"/>
                 </a:solidFill>
                 <a:latin typeface="Consolas" panose="020B0609020204030204" pitchFamily="49" charset="0"/>
               </a:rPr>
-              <a:t>  &lt;</a:t>
-            </a:r>
-            <a:r>
-              <a:rPr lang="da-DK" sz="1400" b="1">
+              <a:t>&lt;</a:t>
+            </a:r>
+            <a:r>
+              <a:rPr lang="da-DK" sz="1200" b="1">
                 <a:solidFill>
                   <a:srgbClr val="569CD6"/>
                 </a:solidFill>
                 <a:latin typeface="Consolas" panose="020B0609020204030204" pitchFamily="49" charset="0"/>
               </a:rPr>
-              <a:t>meta</a:t>
-            </a:r>
-            <a:r>
-              <a:rPr lang="da-DK" sz="1400" b="1">
-                <a:solidFill>
-                  <a:srgbClr val="D4D4D4"/>
-                </a:solidFill>
-                <a:latin typeface="Consolas" panose="020B0609020204030204" pitchFamily="49" charset="0"/>
-              </a:rPr>
-              <a:t> </a:t>
-            </a:r>
-            <a:r>
-              <a:rPr lang="da-DK" sz="1400" b="1">
-                <a:solidFill>
-                  <a:srgbClr val="9CDCFE"/>
-                </a:solidFill>
-                <a:latin typeface="Consolas" panose="020B0609020204030204" pitchFamily="49" charset="0"/>
-              </a:rPr>
-              <a:t>charset</a:t>
-            </a:r>
-            <a:r>
-              <a:rPr lang="da-DK" sz="1400" b="1">
-                <a:solidFill>
-                  <a:srgbClr val="D4D4D4"/>
-                </a:solidFill>
-                <a:latin typeface="Consolas" panose="020B0609020204030204" pitchFamily="49" charset="0"/>
-              </a:rPr>
-              <a:t>=</a:t>
-            </a:r>
-            <a:r>
-              <a:rPr lang="da-DK" sz="1400" b="1">
-                <a:solidFill>
-                  <a:srgbClr val="CE9178"/>
-                </a:solidFill>
-                <a:latin typeface="Consolas" panose="020B0609020204030204" pitchFamily="49" charset="0"/>
-              </a:rPr>
-              <a:t>"utf-8"</a:t>
-            </a:r>
-            <a:r>
-              <a:rPr lang="da-DK" sz="1400" b="1">
+              <a:t>head</a:t>
+            </a:r>
+            <a:r>
+              <a:rPr lang="da-DK" sz="1200" b="1">
                 <a:solidFill>
                   <a:srgbClr val="808080"/>
                 </a:solidFill>
@@ -5074,7 +4675,7 @@
               </a:rPr>
               <a:t>&gt;</a:t>
             </a:r>
-            <a:endParaRPr lang="da-DK" sz="1400" b="1">
+            <a:endParaRPr lang="da-DK" sz="1200" b="1">
               <a:solidFill>
                 <a:srgbClr val="D4D4D4"/>
               </a:solidFill>
@@ -5082,8 +4683,14 @@
             </a:endParaRPr>
           </a:p>
           <a:p>
-            <a:r>
-              <a:rPr lang="da-DK" sz="1400" b="1" smtClean="0">
+            <a:pPr marL="0" indent="0">
+              <a:spcBef>
+                <a:spcPts val="0"/>
+              </a:spcBef>
+              <a:buNone/>
+            </a:pPr>
+            <a:r>
+              <a:rPr lang="da-DK" sz="1200" b="1" smtClean="0">
                 <a:solidFill>
                   <a:srgbClr val="808080"/>
                 </a:solidFill>
@@ -5092,7 +4699,7 @@
               <a:t>  &lt;</a:t>
             </a:r>
             <a:r>
-              <a:rPr lang="da-DK" sz="1400" b="1">
+              <a:rPr lang="da-DK" sz="1200" b="1">
                 <a:solidFill>
                   <a:srgbClr val="569CD6"/>
                 </a:solidFill>
@@ -5101,7 +4708,7 @@
               <a:t>meta</a:t>
             </a:r>
             <a:r>
-              <a:rPr lang="da-DK" sz="1400" b="1">
+              <a:rPr lang="da-DK" sz="1200" b="1">
                 <a:solidFill>
                   <a:srgbClr val="D4D4D4"/>
                 </a:solidFill>
@@ -5110,16 +4717,16 @@
               <a:t> </a:t>
             </a:r>
             <a:r>
-              <a:rPr lang="da-DK" sz="1400" b="1">
+              <a:rPr lang="da-DK" sz="1200" b="1">
                 <a:solidFill>
                   <a:srgbClr val="9CDCFE"/>
                 </a:solidFill>
                 <a:latin typeface="Consolas" panose="020B0609020204030204" pitchFamily="49" charset="0"/>
               </a:rPr>
-              <a:t>name</a:t>
-            </a:r>
-            <a:r>
-              <a:rPr lang="da-DK" sz="1400" b="1">
+              <a:t>charset</a:t>
+            </a:r>
+            <a:r>
+              <a:rPr lang="da-DK" sz="1200" b="1">
                 <a:solidFill>
                   <a:srgbClr val="D4D4D4"/>
                 </a:solidFill>
@@ -5128,52 +4735,16 @@
               <a:t>=</a:t>
             </a:r>
             <a:r>
-              <a:rPr lang="da-DK" sz="1400" b="1">
+              <a:rPr lang="da-DK" sz="1200" b="1">
                 <a:solidFill>
                   <a:srgbClr val="CE9178"/>
                 </a:solidFill>
                 <a:latin typeface="Consolas" panose="020B0609020204030204" pitchFamily="49" charset="0"/>
               </a:rPr>
-              <a:t>"viewport"</a:t>
-            </a:r>
-            <a:r>
-              <a:rPr lang="da-DK" sz="1400" b="1">
-                <a:solidFill>
-                  <a:srgbClr val="D4D4D4"/>
-                </a:solidFill>
-                <a:latin typeface="Consolas" panose="020B0609020204030204" pitchFamily="49" charset="0"/>
-              </a:rPr>
-              <a:t> </a:t>
-            </a:r>
-            <a:r>
-              <a:rPr lang="da-DK" sz="1400" b="1">
-                <a:solidFill>
-                  <a:srgbClr val="9CDCFE"/>
-                </a:solidFill>
-                <a:latin typeface="Consolas" panose="020B0609020204030204" pitchFamily="49" charset="0"/>
-              </a:rPr>
-              <a:t>content</a:t>
-            </a:r>
-            <a:r>
-              <a:rPr lang="da-DK" sz="1400" b="1">
-                <a:solidFill>
-                  <a:srgbClr val="D4D4D4"/>
-                </a:solidFill>
-                <a:latin typeface="Consolas" panose="020B0609020204030204" pitchFamily="49" charset="0"/>
-              </a:rPr>
-              <a:t>=</a:t>
-            </a:r>
-            <a:r>
-              <a:rPr lang="da-DK" sz="1400" b="1">
-                <a:solidFill>
-                  <a:srgbClr val="CE9178"/>
-                </a:solidFill>
-                <a:latin typeface="Consolas" panose="020B0609020204030204" pitchFamily="49" charset="0"/>
-              </a:rPr>
-              <a:t>"width=device-width, initial-scale=1"</a:t>
-            </a:r>
-            <a:r>
-              <a:rPr lang="da-DK" sz="1400" b="1">
+              <a:t>"utf-8"</a:t>
+            </a:r>
+            <a:r>
+              <a:rPr lang="da-DK" sz="1200" b="1">
                 <a:solidFill>
                   <a:srgbClr val="808080"/>
                 </a:solidFill>
@@ -5181,7 +4752,7 @@
               </a:rPr>
               <a:t>&gt;</a:t>
             </a:r>
-            <a:endParaRPr lang="da-DK" sz="1400" b="1">
+            <a:endParaRPr lang="da-DK" sz="1200" b="1">
               <a:solidFill>
                 <a:srgbClr val="D4D4D4"/>
               </a:solidFill>
@@ -5189,8 +4760,14 @@
             </a:endParaRPr>
           </a:p>
           <a:p>
-            <a:r>
-              <a:rPr lang="da-DK" sz="1400" b="1" smtClean="0">
+            <a:pPr marL="0" indent="0">
+              <a:spcBef>
+                <a:spcPts val="0"/>
+              </a:spcBef>
+              <a:buNone/>
+            </a:pPr>
+            <a:r>
+              <a:rPr lang="da-DK" sz="1200" b="1" smtClean="0">
                 <a:solidFill>
                   <a:srgbClr val="808080"/>
                 </a:solidFill>
@@ -5199,16 +4776,16 @@
               <a:t>  &lt;</a:t>
             </a:r>
             <a:r>
-              <a:rPr lang="da-DK" sz="1400" b="1">
+              <a:rPr lang="da-DK" sz="1200" b="1">
                 <a:solidFill>
                   <a:srgbClr val="569CD6"/>
                 </a:solidFill>
                 <a:latin typeface="Consolas" panose="020B0609020204030204" pitchFamily="49" charset="0"/>
               </a:rPr>
-              <a:t>link</a:t>
-            </a:r>
-            <a:r>
-              <a:rPr lang="da-DK" sz="1400" b="1">
+              <a:t>meta</a:t>
+            </a:r>
+            <a:r>
+              <a:rPr lang="da-DK" sz="1200" b="1">
                 <a:solidFill>
                   <a:srgbClr val="D4D4D4"/>
                 </a:solidFill>
@@ -5217,16 +4794,16 @@
               <a:t> </a:t>
             </a:r>
             <a:r>
-              <a:rPr lang="da-DK" sz="1400" b="1">
+              <a:rPr lang="da-DK" sz="1200" b="1">
                 <a:solidFill>
                   <a:srgbClr val="9CDCFE"/>
                 </a:solidFill>
                 <a:latin typeface="Consolas" panose="020B0609020204030204" pitchFamily="49" charset="0"/>
               </a:rPr>
-              <a:t>rel</a:t>
-            </a:r>
-            <a:r>
-              <a:rPr lang="da-DK" sz="1400" b="1">
+              <a:t>name</a:t>
+            </a:r>
+            <a:r>
+              <a:rPr lang="da-DK" sz="1200" b="1">
                 <a:solidFill>
                   <a:srgbClr val="D4D4D4"/>
                 </a:solidFill>
@@ -5235,16 +4812,16 @@
               <a:t>=</a:t>
             </a:r>
             <a:r>
-              <a:rPr lang="da-DK" sz="1400" b="1">
+              <a:rPr lang="da-DK" sz="1200" b="1">
                 <a:solidFill>
                   <a:srgbClr val="CE9178"/>
                 </a:solidFill>
                 <a:latin typeface="Consolas" panose="020B0609020204030204" pitchFamily="49" charset="0"/>
               </a:rPr>
-              <a:t>"stylesheet"</a:t>
-            </a:r>
-            <a:r>
-              <a:rPr lang="da-DK" sz="1400" b="1">
+              <a:t>"viewport"</a:t>
+            </a:r>
+            <a:r>
+              <a:rPr lang="da-DK" sz="1200" b="1">
                 <a:solidFill>
                   <a:srgbClr val="D4D4D4"/>
                 </a:solidFill>
@@ -5253,16 +4830,16 @@
               <a:t> </a:t>
             </a:r>
             <a:r>
-              <a:rPr lang="da-DK" sz="1400" b="1">
+              <a:rPr lang="da-DK" sz="1200" b="1">
                 <a:solidFill>
                   <a:srgbClr val="9CDCFE"/>
                 </a:solidFill>
                 <a:latin typeface="Consolas" panose="020B0609020204030204" pitchFamily="49" charset="0"/>
               </a:rPr>
-              <a:t>href</a:t>
-            </a:r>
-            <a:r>
-              <a:rPr lang="da-DK" sz="1400" b="1">
+              <a:t>content</a:t>
+            </a:r>
+            <a:r>
+              <a:rPr lang="da-DK" sz="1200" b="1">
                 <a:solidFill>
                   <a:srgbClr val="D4D4D4"/>
                 </a:solidFill>
@@ -5271,16 +4848,16 @@
               <a:t>=</a:t>
             </a:r>
             <a:r>
-              <a:rPr lang="da-DK" sz="1400" b="1">
+              <a:rPr lang="da-DK" sz="1200" b="1">
                 <a:solidFill>
                   <a:srgbClr val="CE9178"/>
                 </a:solidFill>
                 <a:latin typeface="Consolas" panose="020B0609020204030204" pitchFamily="49" charset="0"/>
               </a:rPr>
-              <a:t>"https://maxcdn.bootstrapcdn.com/bootstrap/4.2.1/css/bootstrap.min.css"</a:t>
-            </a:r>
-            <a:r>
-              <a:rPr lang="da-DK" sz="1400" b="1">
+              <a:t>"width=device-width, initial-scale=1, shrink-to-fit=no"</a:t>
+            </a:r>
+            <a:r>
+              <a:rPr lang="da-DK" sz="1200" b="1">
                 <a:solidFill>
                   <a:srgbClr val="808080"/>
                 </a:solidFill>
@@ -5288,7 +4865,7 @@
               </a:rPr>
               <a:t>&gt;</a:t>
             </a:r>
-            <a:endParaRPr lang="da-DK" sz="1400" b="1">
+            <a:endParaRPr lang="da-DK" sz="1200" b="1">
               <a:solidFill>
                 <a:srgbClr val="D4D4D4"/>
               </a:solidFill>
@@ -5296,88 +4873,31 @@
             </a:endParaRPr>
           </a:p>
           <a:p>
-            <a:r>
-              <a:rPr lang="da-DK" sz="1400" b="1" smtClean="0">
-                <a:solidFill>
-                  <a:srgbClr val="808080"/>
-                </a:solidFill>
-                <a:latin typeface="Consolas" panose="020B0609020204030204" pitchFamily="49" charset="0"/>
-              </a:rPr>
-              <a:t>  &lt;</a:t>
-            </a:r>
-            <a:r>
-              <a:rPr lang="da-DK" sz="1400" b="1">
-                <a:solidFill>
-                  <a:srgbClr val="569CD6"/>
-                </a:solidFill>
-                <a:latin typeface="Consolas" panose="020B0609020204030204" pitchFamily="49" charset="0"/>
-              </a:rPr>
-              <a:t>script</a:t>
-            </a:r>
-            <a:r>
-              <a:rPr lang="da-DK" sz="1400" b="1">
-                <a:solidFill>
-                  <a:srgbClr val="D4D4D4"/>
-                </a:solidFill>
-                <a:latin typeface="Consolas" panose="020B0609020204030204" pitchFamily="49" charset="0"/>
-              </a:rPr>
-              <a:t> </a:t>
-            </a:r>
-            <a:r>
-              <a:rPr lang="da-DK" sz="1400" b="1">
-                <a:solidFill>
-                  <a:srgbClr val="9CDCFE"/>
-                </a:solidFill>
-                <a:latin typeface="Consolas" panose="020B0609020204030204" pitchFamily="49" charset="0"/>
-              </a:rPr>
-              <a:t>src</a:t>
-            </a:r>
-            <a:r>
-              <a:rPr lang="da-DK" sz="1400" b="1">
-                <a:solidFill>
-                  <a:srgbClr val="D4D4D4"/>
-                </a:solidFill>
-                <a:latin typeface="Consolas" panose="020B0609020204030204" pitchFamily="49" charset="0"/>
-              </a:rPr>
-              <a:t>=</a:t>
-            </a:r>
-            <a:r>
-              <a:rPr lang="da-DK" sz="1400" b="1">
-                <a:solidFill>
-                  <a:srgbClr val="CE9178"/>
-                </a:solidFill>
-                <a:latin typeface="Consolas" panose="020B0609020204030204" pitchFamily="49" charset="0"/>
-              </a:rPr>
-              <a:t>"https://ajax.googleapis.com/ajax/libs/jquery/3.3.1/jquery.min.js"</a:t>
-            </a:r>
-            <a:r>
-              <a:rPr lang="da-DK" sz="1400" b="1">
-                <a:solidFill>
-                  <a:srgbClr val="808080"/>
-                </a:solidFill>
-                <a:latin typeface="Consolas" panose="020B0609020204030204" pitchFamily="49" charset="0"/>
-              </a:rPr>
-              <a:t>&gt;&lt;/</a:t>
-            </a:r>
-            <a:r>
-              <a:rPr lang="da-DK" sz="1400" b="1">
-                <a:solidFill>
-                  <a:srgbClr val="569CD6"/>
-                </a:solidFill>
-                <a:latin typeface="Consolas" panose="020B0609020204030204" pitchFamily="49" charset="0"/>
-              </a:rPr>
-              <a:t>script</a:t>
-            </a:r>
-            <a:r>
-              <a:rPr lang="da-DK" sz="1400" b="1">
-                <a:solidFill>
-                  <a:srgbClr val="808080"/>
-                </a:solidFill>
-                <a:latin typeface="Consolas" panose="020B0609020204030204" pitchFamily="49" charset="0"/>
-              </a:rPr>
-              <a:t>&gt;</a:t>
-            </a:r>
-            <a:endParaRPr lang="da-DK" sz="1400" b="1">
+            <a:pPr marL="0" indent="0">
+              <a:spcBef>
+                <a:spcPts val="0"/>
+              </a:spcBef>
+              <a:buNone/>
+            </a:pPr>
+            <a:r>
+              <a:rPr lang="da-DK" sz="1200" b="1" smtClean="0">
+                <a:solidFill>
+                  <a:srgbClr val="6A9955"/>
+                </a:solidFill>
+                <a:latin typeface="Consolas" panose="020B0609020204030204" pitchFamily="49" charset="0"/>
+              </a:rPr>
+              <a:t>  &lt;!-- </a:t>
+            </a:r>
+            <a:r>
+              <a:rPr lang="da-DK" sz="1200" b="1">
+                <a:solidFill>
+                  <a:srgbClr val="6A9955"/>
+                </a:solidFill>
+                <a:latin typeface="Consolas" panose="020B0609020204030204" pitchFamily="49" charset="0"/>
+              </a:rPr>
+              <a:t>Bootstrap CSS --&gt;</a:t>
+            </a:r>
+            <a:endParaRPr lang="da-DK" sz="1200" b="1">
               <a:solidFill>
                 <a:srgbClr val="D4D4D4"/>
               </a:solidFill>
@@ -5385,8 +4905,14 @@
             </a:endParaRPr>
           </a:p>
           <a:p>
-            <a:r>
-              <a:rPr lang="da-DK" sz="1400" b="1" smtClean="0">
+            <a:pPr marL="0" indent="0">
+              <a:spcBef>
+                <a:spcPts val="0"/>
+              </a:spcBef>
+              <a:buNone/>
+            </a:pPr>
+            <a:r>
+              <a:rPr lang="da-DK" sz="1200" b="1" smtClean="0">
                 <a:solidFill>
                   <a:srgbClr val="808080"/>
                 </a:solidFill>
@@ -5395,16 +4921,16 @@
               <a:t>  &lt;</a:t>
             </a:r>
             <a:r>
-              <a:rPr lang="da-DK" sz="1400" b="1">
+              <a:rPr lang="da-DK" sz="1200" b="1">
                 <a:solidFill>
                   <a:srgbClr val="569CD6"/>
                 </a:solidFill>
                 <a:latin typeface="Consolas" panose="020B0609020204030204" pitchFamily="49" charset="0"/>
               </a:rPr>
-              <a:t>script</a:t>
-            </a:r>
-            <a:r>
-              <a:rPr lang="da-DK" sz="1400" b="1">
+              <a:t>link</a:t>
+            </a:r>
+            <a:r>
+              <a:rPr lang="da-DK" sz="1200" b="1">
                 <a:solidFill>
                   <a:srgbClr val="D4D4D4"/>
                 </a:solidFill>
@@ -5413,16 +4939,16 @@
               <a:t> </a:t>
             </a:r>
             <a:r>
-              <a:rPr lang="da-DK" sz="1400" b="1">
+              <a:rPr lang="da-DK" sz="1200" b="1">
                 <a:solidFill>
                   <a:srgbClr val="9CDCFE"/>
                 </a:solidFill>
                 <a:latin typeface="Consolas" panose="020B0609020204030204" pitchFamily="49" charset="0"/>
               </a:rPr>
-              <a:t>src</a:t>
-            </a:r>
-            <a:r>
-              <a:rPr lang="da-DK" sz="1400" b="1">
+              <a:t>rel</a:t>
+            </a:r>
+            <a:r>
+              <a:rPr lang="da-DK" sz="1200" b="1">
                 <a:solidFill>
                   <a:srgbClr val="D4D4D4"/>
                 </a:solidFill>
@@ -5431,42 +4957,60 @@
               <a:t>=</a:t>
             </a:r>
             <a:r>
-              <a:rPr lang="da-DK" sz="1400" b="1">
+              <a:rPr lang="da-DK" sz="1200" b="1">
                 <a:solidFill>
                   <a:srgbClr val="CE9178"/>
                 </a:solidFill>
                 <a:latin typeface="Consolas" panose="020B0609020204030204" pitchFamily="49" charset="0"/>
               </a:rPr>
-              <a:t>"https://cdnjs.cloudflare.com/ajax/libs/popper.js/1.14.6/umd/popper.min.js"</a:t>
-            </a:r>
-            <a:r>
-              <a:rPr lang="da-DK" sz="1400" b="1">
+              <a:t>"stylesheet"</a:t>
+            </a:r>
+            <a:r>
+              <a:rPr lang="da-DK" sz="1200" b="1">
+                <a:solidFill>
+                  <a:srgbClr val="D4D4D4"/>
+                </a:solidFill>
+                <a:latin typeface="Consolas" panose="020B0609020204030204" pitchFamily="49" charset="0"/>
+              </a:rPr>
+              <a:t> </a:t>
+            </a:r>
+            <a:r>
+              <a:rPr lang="da-DK" sz="1200" b="1">
+                <a:solidFill>
+                  <a:srgbClr val="9CDCFE"/>
+                </a:solidFill>
+                <a:latin typeface="Consolas" panose="020B0609020204030204" pitchFamily="49" charset="0"/>
+              </a:rPr>
+              <a:t>href</a:t>
+            </a:r>
+            <a:r>
+              <a:rPr lang="da-DK" sz="1200" b="1">
+                <a:solidFill>
+                  <a:srgbClr val="D4D4D4"/>
+                </a:solidFill>
+                <a:latin typeface="Consolas" panose="020B0609020204030204" pitchFamily="49" charset="0"/>
+              </a:rPr>
+              <a:t>=</a:t>
+            </a:r>
+            <a:r>
+              <a:rPr lang="da-DK" sz="1200" b="1">
+                <a:solidFill>
+                  <a:srgbClr val="CE9178"/>
+                </a:solidFill>
+                <a:latin typeface="Consolas" panose="020B0609020204030204" pitchFamily="49" charset="0"/>
+              </a:rPr>
+              <a:t>"https://stackpath.bootstrapcdn.com/bootstrap/4.3.0/css/bootstrap.min.css"</a:t>
+            </a:r>
+            <a:r>
+              <a:rPr lang="da-DK" sz="1200" b="1">
                 <a:solidFill>
                   <a:srgbClr val="808080"/>
                 </a:solidFill>
                 <a:latin typeface="Consolas" panose="020B0609020204030204" pitchFamily="49" charset="0"/>
               </a:rPr>
-              <a:t>&gt;&lt;/</a:t>
-            </a:r>
-            <a:r>
-              <a:rPr lang="da-DK" sz="1400" b="1">
-                <a:solidFill>
-                  <a:srgbClr val="569CD6"/>
-                </a:solidFill>
-                <a:latin typeface="Consolas" panose="020B0609020204030204" pitchFamily="49" charset="0"/>
-              </a:rPr>
-              <a:t>script</a:t>
-            </a:r>
-            <a:r>
-              <a:rPr lang="da-DK" sz="1400" b="1">
-                <a:solidFill>
-                  <a:srgbClr val="808080"/>
-                </a:solidFill>
-                <a:latin typeface="Consolas" panose="020B0609020204030204" pitchFamily="49" charset="0"/>
-              </a:rPr>
               <a:t>&gt;</a:t>
             </a:r>
-            <a:endParaRPr lang="da-DK" sz="1400" b="1">
+            <a:endParaRPr lang="da-DK" sz="1200" b="1">
               <a:solidFill>
                 <a:srgbClr val="D4D4D4"/>
               </a:solidFill>
@@ -5474,8 +5018,14 @@
             </a:endParaRPr>
           </a:p>
           <a:p>
-            <a:r>
-              <a:rPr lang="da-DK" sz="1400" b="1" smtClean="0">
+            <a:pPr marL="0" indent="0">
+              <a:spcBef>
+                <a:spcPts val="0"/>
+              </a:spcBef>
+              <a:buNone/>
+            </a:pPr>
+            <a:r>
+              <a:rPr lang="da-DK" sz="1200" b="1" smtClean="0">
                 <a:solidFill>
                   <a:srgbClr val="808080"/>
                 </a:solidFill>
@@ -5484,70 +5034,52 @@
               <a:t>  &lt;</a:t>
             </a:r>
             <a:r>
-              <a:rPr lang="da-DK" sz="1400" b="1">
+              <a:rPr lang="da-DK" sz="1200" b="1">
                 <a:solidFill>
                   <a:srgbClr val="569CD6"/>
                 </a:solidFill>
                 <a:latin typeface="Consolas" panose="020B0609020204030204" pitchFamily="49" charset="0"/>
               </a:rPr>
-              <a:t>script</a:t>
-            </a:r>
-            <a:r>
-              <a:rPr lang="da-DK" sz="1400" b="1">
+              <a:t>title</a:t>
+            </a:r>
+            <a:r>
+              <a:rPr lang="da-DK" sz="1200" b="1">
+                <a:solidFill>
+                  <a:srgbClr val="808080"/>
+                </a:solidFill>
+                <a:latin typeface="Consolas" panose="020B0609020204030204" pitchFamily="49" charset="0"/>
+              </a:rPr>
+              <a:t>&gt;</a:t>
+            </a:r>
+            <a:r>
+              <a:rPr lang="da-DK" sz="1200" b="1">
                 <a:solidFill>
                   <a:srgbClr val="D4D4D4"/>
                 </a:solidFill>
                 <a:latin typeface="Consolas" panose="020B0609020204030204" pitchFamily="49" charset="0"/>
               </a:rPr>
-              <a:t> </a:t>
-            </a:r>
-            <a:r>
-              <a:rPr lang="da-DK" sz="1400" b="1">
-                <a:solidFill>
-                  <a:srgbClr val="9CDCFE"/>
-                </a:solidFill>
-                <a:latin typeface="Consolas" panose="020B0609020204030204" pitchFamily="49" charset="0"/>
-              </a:rPr>
-              <a:t>src</a:t>
-            </a:r>
-            <a:r>
-              <a:rPr lang="da-DK" sz="1400" b="1">
-                <a:solidFill>
-                  <a:srgbClr val="D4D4D4"/>
-                </a:solidFill>
-                <a:latin typeface="Consolas" panose="020B0609020204030204" pitchFamily="49" charset="0"/>
-              </a:rPr>
-              <a:t>=</a:t>
-            </a:r>
-            <a:r>
-              <a:rPr lang="da-DK" sz="1400" b="1">
-                <a:solidFill>
-                  <a:srgbClr val="CE9178"/>
-                </a:solidFill>
-                <a:latin typeface="Consolas" panose="020B0609020204030204" pitchFamily="49" charset="0"/>
-              </a:rPr>
-              <a:t>"https://maxcdn.bootstrapcdn.com/bootstrap/4.2.1/js/bootstrap.min.js"</a:t>
-            </a:r>
-            <a:r>
-              <a:rPr lang="da-DK" sz="1400" b="1">
+              <a:t>Hello, world!</a:t>
+            </a:r>
+            <a:r>
+              <a:rPr lang="da-DK" sz="1200" b="1">
                 <a:solidFill>
                   <a:srgbClr val="808080"/>
                 </a:solidFill>
                 <a:latin typeface="Consolas" panose="020B0609020204030204" pitchFamily="49" charset="0"/>
               </a:rPr>
-              <a:t>&gt;&lt;/</a:t>
-            </a:r>
-            <a:r>
-              <a:rPr lang="da-DK" sz="1400" b="1">
+              <a:t>&lt;/</a:t>
+            </a:r>
+            <a:r>
+              <a:rPr lang="da-DK" sz="1200" b="1">
                 <a:solidFill>
                   <a:srgbClr val="569CD6"/>
                 </a:solidFill>
                 <a:latin typeface="Consolas" panose="020B0609020204030204" pitchFamily="49" charset="0"/>
               </a:rPr>
-              <a:t>script</a:t>
-            </a:r>
-            <a:r>
-              <a:rPr lang="da-DK" sz="1400" b="1" smtClean="0">
+              <a:t>title</a:t>
+            </a:r>
+            <a:r>
+              <a:rPr lang="da-DK" sz="1200" b="1">
                 <a:solidFill>
                   <a:srgbClr val="808080"/>
                 </a:solidFill>
@@ -5555,7 +5087,7 @@
               </a:rPr>
               <a:t>&gt;</a:t>
             </a:r>
-            <a:endParaRPr lang="da-DK" sz="1400" b="1" smtClean="0">
+            <a:endParaRPr lang="da-DK" sz="1200" b="1">
               <a:solidFill>
                 <a:srgbClr val="D4D4D4"/>
               </a:solidFill>
@@ -5563,8 +5095,14 @@
             </a:endParaRPr>
           </a:p>
           <a:p>
-            <a:r>
-              <a:rPr lang="da-DK" sz="1400" b="1" smtClean="0">
+            <a:pPr marL="0" indent="0">
+              <a:spcBef>
+                <a:spcPts val="0"/>
+              </a:spcBef>
+              <a:buNone/>
+            </a:pPr>
+            <a:r>
+              <a:rPr lang="da-DK" sz="1200" b="1">
                 <a:solidFill>
                   <a:srgbClr val="808080"/>
                 </a:solidFill>
@@ -5573,7 +5111,7 @@
               <a:t>&lt;/</a:t>
             </a:r>
             <a:r>
-              <a:rPr lang="da-DK" sz="1400" b="1" smtClean="0">
+              <a:rPr lang="da-DK" sz="1200" b="1">
                 <a:solidFill>
                   <a:srgbClr val="569CD6"/>
                 </a:solidFill>
@@ -5582,7 +5120,7 @@
               <a:t>head</a:t>
             </a:r>
             <a:r>
-              <a:rPr lang="da-DK" sz="1400" b="1" smtClean="0">
+              <a:rPr lang="da-DK" sz="1200" b="1">
                 <a:solidFill>
                   <a:srgbClr val="808080"/>
                 </a:solidFill>
@@ -5590,7 +5128,7 @@
               </a:rPr>
               <a:t>&gt;</a:t>
             </a:r>
-            <a:endParaRPr lang="da-DK" sz="1400" b="1" smtClean="0">
+            <a:endParaRPr lang="da-DK" sz="1200" b="1">
               <a:solidFill>
                 <a:srgbClr val="D4D4D4"/>
               </a:solidFill>
@@ -5598,14 +5136,509 @@
             </a:endParaRPr>
           </a:p>
           <a:p>
-            <a:endParaRPr lang="da-DK" sz="1200"/>
+            <a:pPr marL="0" indent="0">
+              <a:spcBef>
+                <a:spcPts val="0"/>
+              </a:spcBef>
+              <a:buNone/>
+            </a:pPr>
+            <a:r>
+              <a:rPr lang="da-DK" sz="1200" b="1">
+                <a:solidFill>
+                  <a:srgbClr val="D4D4D4"/>
+                </a:solidFill>
+                <a:latin typeface="Consolas" panose="020B0609020204030204" pitchFamily="49" charset="0"/>
+              </a:rPr>
+              <a:t/>
+            </a:r>
+            <a:br>
+              <a:rPr lang="da-DK" sz="1200" b="1">
+                <a:solidFill>
+                  <a:srgbClr val="D4D4D4"/>
+                </a:solidFill>
+                <a:latin typeface="Consolas" panose="020B0609020204030204" pitchFamily="49" charset="0"/>
+              </a:rPr>
+            </a:br>
+            <a:r>
+              <a:rPr lang="da-DK" sz="1200" b="1">
+                <a:solidFill>
+                  <a:srgbClr val="808080"/>
+                </a:solidFill>
+                <a:latin typeface="Consolas" panose="020B0609020204030204" pitchFamily="49" charset="0"/>
+              </a:rPr>
+              <a:t>&lt;</a:t>
+            </a:r>
+            <a:r>
+              <a:rPr lang="da-DK" sz="1200" b="1">
+                <a:solidFill>
+                  <a:srgbClr val="569CD6"/>
+                </a:solidFill>
+                <a:latin typeface="Consolas" panose="020B0609020204030204" pitchFamily="49" charset="0"/>
+              </a:rPr>
+              <a:t>body</a:t>
+            </a:r>
+            <a:r>
+              <a:rPr lang="da-DK" sz="1200" b="1">
+                <a:solidFill>
+                  <a:srgbClr val="808080"/>
+                </a:solidFill>
+                <a:latin typeface="Consolas" panose="020B0609020204030204" pitchFamily="49" charset="0"/>
+              </a:rPr>
+              <a:t>&gt;</a:t>
+            </a:r>
+            <a:endParaRPr lang="da-DK" sz="1200" b="1">
+              <a:solidFill>
+                <a:srgbClr val="D4D4D4"/>
+              </a:solidFill>
+              <a:latin typeface="Consolas" panose="020B0609020204030204" pitchFamily="49" charset="0"/>
+            </a:endParaRPr>
+          </a:p>
+          <a:p>
+            <a:pPr marL="0" indent="0">
+              <a:spcBef>
+                <a:spcPts val="0"/>
+              </a:spcBef>
+              <a:buNone/>
+            </a:pPr>
+            <a:r>
+              <a:rPr lang="da-DK" sz="1200" b="1" smtClean="0">
+                <a:solidFill>
+                  <a:srgbClr val="6A9955"/>
+                </a:solidFill>
+                <a:latin typeface="Consolas" panose="020B0609020204030204" pitchFamily="49" charset="0"/>
+              </a:rPr>
+              <a:t>&lt;!-- </a:t>
+            </a:r>
+            <a:r>
+              <a:rPr lang="da-DK" sz="1200" b="1">
+                <a:solidFill>
+                  <a:srgbClr val="6A9955"/>
+                </a:solidFill>
+                <a:latin typeface="Consolas" panose="020B0609020204030204" pitchFamily="49" charset="0"/>
+              </a:rPr>
+              <a:t>Optional JavaScript --&gt;</a:t>
+            </a:r>
+            <a:endParaRPr lang="da-DK" sz="1200" b="1">
+              <a:solidFill>
+                <a:srgbClr val="D4D4D4"/>
+              </a:solidFill>
+              <a:latin typeface="Consolas" panose="020B0609020204030204" pitchFamily="49" charset="0"/>
+            </a:endParaRPr>
+          </a:p>
+          <a:p>
+            <a:pPr marL="0" indent="0">
+              <a:spcBef>
+                <a:spcPts val="0"/>
+              </a:spcBef>
+              <a:buNone/>
+            </a:pPr>
+            <a:r>
+              <a:rPr lang="da-DK" sz="1200" b="1" smtClean="0">
+                <a:solidFill>
+                  <a:srgbClr val="808080"/>
+                </a:solidFill>
+                <a:latin typeface="Consolas" panose="020B0609020204030204" pitchFamily="49" charset="0"/>
+              </a:rPr>
+              <a:t>  &lt;</a:t>
+            </a:r>
+            <a:r>
+              <a:rPr lang="da-DK" sz="1200" b="1">
+                <a:solidFill>
+                  <a:srgbClr val="569CD6"/>
+                </a:solidFill>
+                <a:latin typeface="Consolas" panose="020B0609020204030204" pitchFamily="49" charset="0"/>
+              </a:rPr>
+              <a:t>script</a:t>
+            </a:r>
+            <a:r>
+              <a:rPr lang="da-DK" sz="1200" b="1">
+                <a:solidFill>
+                  <a:srgbClr val="D4D4D4"/>
+                </a:solidFill>
+                <a:latin typeface="Consolas" panose="020B0609020204030204" pitchFamily="49" charset="0"/>
+              </a:rPr>
+              <a:t> </a:t>
+            </a:r>
+            <a:r>
+              <a:rPr lang="da-DK" sz="1200" b="1">
+                <a:solidFill>
+                  <a:srgbClr val="9CDCFE"/>
+                </a:solidFill>
+                <a:latin typeface="Consolas" panose="020B0609020204030204" pitchFamily="49" charset="0"/>
+              </a:rPr>
+              <a:t>src</a:t>
+            </a:r>
+            <a:r>
+              <a:rPr lang="da-DK" sz="1200" b="1">
+                <a:solidFill>
+                  <a:srgbClr val="D4D4D4"/>
+                </a:solidFill>
+                <a:latin typeface="Consolas" panose="020B0609020204030204" pitchFamily="49" charset="0"/>
+              </a:rPr>
+              <a:t>=</a:t>
+            </a:r>
+            <a:r>
+              <a:rPr lang="da-DK" sz="1200" b="1">
+                <a:solidFill>
+                  <a:srgbClr val="CE9178"/>
+                </a:solidFill>
+                <a:latin typeface="Consolas" panose="020B0609020204030204" pitchFamily="49" charset="0"/>
+              </a:rPr>
+              <a:t>"https://code.jquery.com/jquery-3.3.1.slim.min.js"</a:t>
+            </a:r>
+            <a:r>
+              <a:rPr lang="da-DK" sz="1200" b="1">
+                <a:solidFill>
+                  <a:srgbClr val="808080"/>
+                </a:solidFill>
+                <a:latin typeface="Consolas" panose="020B0609020204030204" pitchFamily="49" charset="0"/>
+              </a:rPr>
+              <a:t>&gt;&lt;/</a:t>
+            </a:r>
+            <a:r>
+              <a:rPr lang="da-DK" sz="1200" b="1">
+                <a:solidFill>
+                  <a:srgbClr val="569CD6"/>
+                </a:solidFill>
+                <a:latin typeface="Consolas" panose="020B0609020204030204" pitchFamily="49" charset="0"/>
+              </a:rPr>
+              <a:t>script</a:t>
+            </a:r>
+            <a:r>
+              <a:rPr lang="da-DK" sz="1200" b="1">
+                <a:solidFill>
+                  <a:srgbClr val="808080"/>
+                </a:solidFill>
+                <a:latin typeface="Consolas" panose="020B0609020204030204" pitchFamily="49" charset="0"/>
+              </a:rPr>
+              <a:t>&gt;</a:t>
+            </a:r>
+            <a:endParaRPr lang="da-DK" sz="1200" b="1">
+              <a:solidFill>
+                <a:srgbClr val="D4D4D4"/>
+              </a:solidFill>
+              <a:latin typeface="Consolas" panose="020B0609020204030204" pitchFamily="49" charset="0"/>
+            </a:endParaRPr>
+          </a:p>
+          <a:p>
+            <a:pPr marL="0" indent="0">
+              <a:spcBef>
+                <a:spcPts val="0"/>
+              </a:spcBef>
+              <a:buNone/>
+            </a:pPr>
+            <a:r>
+              <a:rPr lang="da-DK" sz="1200" b="1" smtClean="0">
+                <a:solidFill>
+                  <a:srgbClr val="808080"/>
+                </a:solidFill>
+                <a:latin typeface="Consolas" panose="020B0609020204030204" pitchFamily="49" charset="0"/>
+              </a:rPr>
+              <a:t>  &lt;</a:t>
+            </a:r>
+            <a:r>
+              <a:rPr lang="da-DK" sz="1200" b="1">
+                <a:solidFill>
+                  <a:srgbClr val="569CD6"/>
+                </a:solidFill>
+                <a:latin typeface="Consolas" panose="020B0609020204030204" pitchFamily="49" charset="0"/>
+              </a:rPr>
+              <a:t>script</a:t>
+            </a:r>
+            <a:r>
+              <a:rPr lang="da-DK" sz="1200" b="1">
+                <a:solidFill>
+                  <a:srgbClr val="D4D4D4"/>
+                </a:solidFill>
+                <a:latin typeface="Consolas" panose="020B0609020204030204" pitchFamily="49" charset="0"/>
+              </a:rPr>
+              <a:t> </a:t>
+            </a:r>
+            <a:r>
+              <a:rPr lang="da-DK" sz="1200" b="1">
+                <a:solidFill>
+                  <a:srgbClr val="9CDCFE"/>
+                </a:solidFill>
+                <a:latin typeface="Consolas" panose="020B0609020204030204" pitchFamily="49" charset="0"/>
+              </a:rPr>
+              <a:t>src</a:t>
+            </a:r>
+            <a:r>
+              <a:rPr lang="da-DK" sz="1200" b="1">
+                <a:solidFill>
+                  <a:srgbClr val="D4D4D4"/>
+                </a:solidFill>
+                <a:latin typeface="Consolas" panose="020B0609020204030204" pitchFamily="49" charset="0"/>
+              </a:rPr>
+              <a:t>=</a:t>
+            </a:r>
+            <a:r>
+              <a:rPr lang="da-DK" sz="1200" b="1">
+                <a:solidFill>
+                  <a:srgbClr val="CE9178"/>
+                </a:solidFill>
+                <a:latin typeface="Consolas" panose="020B0609020204030204" pitchFamily="49" charset="0"/>
+              </a:rPr>
+              <a:t>"https://cdnjs.cloudflare.com/ajax/libs/popper.js/1.14.7/umd/popper.min.js"</a:t>
+            </a:r>
+            <a:r>
+              <a:rPr lang="da-DK" sz="1200" b="1">
+                <a:solidFill>
+                  <a:srgbClr val="808080"/>
+                </a:solidFill>
+                <a:latin typeface="Consolas" panose="020B0609020204030204" pitchFamily="49" charset="0"/>
+              </a:rPr>
+              <a:t>&gt;&lt;/</a:t>
+            </a:r>
+            <a:r>
+              <a:rPr lang="da-DK" sz="1200" b="1">
+                <a:solidFill>
+                  <a:srgbClr val="569CD6"/>
+                </a:solidFill>
+                <a:latin typeface="Consolas" panose="020B0609020204030204" pitchFamily="49" charset="0"/>
+              </a:rPr>
+              <a:t>script</a:t>
+            </a:r>
+            <a:r>
+              <a:rPr lang="da-DK" sz="1200" b="1">
+                <a:solidFill>
+                  <a:srgbClr val="808080"/>
+                </a:solidFill>
+                <a:latin typeface="Consolas" panose="020B0609020204030204" pitchFamily="49" charset="0"/>
+              </a:rPr>
+              <a:t>&gt;</a:t>
+            </a:r>
+            <a:endParaRPr lang="da-DK" sz="1200" b="1">
+              <a:solidFill>
+                <a:srgbClr val="D4D4D4"/>
+              </a:solidFill>
+              <a:latin typeface="Consolas" panose="020B0609020204030204" pitchFamily="49" charset="0"/>
+            </a:endParaRPr>
+          </a:p>
+          <a:p>
+            <a:pPr marL="0" indent="0">
+              <a:spcBef>
+                <a:spcPts val="0"/>
+              </a:spcBef>
+              <a:buNone/>
+            </a:pPr>
+            <a:r>
+              <a:rPr lang="da-DK" sz="1200" b="1" smtClean="0">
+                <a:solidFill>
+                  <a:srgbClr val="808080"/>
+                </a:solidFill>
+                <a:latin typeface="Consolas" panose="020B0609020204030204" pitchFamily="49" charset="0"/>
+              </a:rPr>
+              <a:t>  &lt;</a:t>
+            </a:r>
+            <a:r>
+              <a:rPr lang="da-DK" sz="1200" b="1">
+                <a:solidFill>
+                  <a:srgbClr val="569CD6"/>
+                </a:solidFill>
+                <a:latin typeface="Consolas" panose="020B0609020204030204" pitchFamily="49" charset="0"/>
+              </a:rPr>
+              <a:t>script</a:t>
+            </a:r>
+            <a:r>
+              <a:rPr lang="da-DK" sz="1200" b="1">
+                <a:solidFill>
+                  <a:srgbClr val="D4D4D4"/>
+                </a:solidFill>
+                <a:latin typeface="Consolas" panose="020B0609020204030204" pitchFamily="49" charset="0"/>
+              </a:rPr>
+              <a:t> </a:t>
+            </a:r>
+            <a:r>
+              <a:rPr lang="da-DK" sz="1200" b="1">
+                <a:solidFill>
+                  <a:srgbClr val="9CDCFE"/>
+                </a:solidFill>
+                <a:latin typeface="Consolas" panose="020B0609020204030204" pitchFamily="49" charset="0"/>
+              </a:rPr>
+              <a:t>src</a:t>
+            </a:r>
+            <a:r>
+              <a:rPr lang="da-DK" sz="1200" b="1">
+                <a:solidFill>
+                  <a:srgbClr val="D4D4D4"/>
+                </a:solidFill>
+                <a:latin typeface="Consolas" panose="020B0609020204030204" pitchFamily="49" charset="0"/>
+              </a:rPr>
+              <a:t>=</a:t>
+            </a:r>
+            <a:r>
+              <a:rPr lang="da-DK" sz="1200" b="1">
+                <a:solidFill>
+                  <a:srgbClr val="CE9178"/>
+                </a:solidFill>
+                <a:latin typeface="Consolas" panose="020B0609020204030204" pitchFamily="49" charset="0"/>
+              </a:rPr>
+              <a:t>"https://stackpath.bootstrapcdn.com/bootstrap/4.3.0/js/bootstrap.min.js"</a:t>
+            </a:r>
+            <a:r>
+              <a:rPr lang="da-DK" sz="1200" b="1">
+                <a:solidFill>
+                  <a:srgbClr val="808080"/>
+                </a:solidFill>
+                <a:latin typeface="Consolas" panose="020B0609020204030204" pitchFamily="49" charset="0"/>
+              </a:rPr>
+              <a:t>&gt;&lt;/</a:t>
+            </a:r>
+            <a:r>
+              <a:rPr lang="da-DK" sz="1200" b="1">
+                <a:solidFill>
+                  <a:srgbClr val="569CD6"/>
+                </a:solidFill>
+                <a:latin typeface="Consolas" panose="020B0609020204030204" pitchFamily="49" charset="0"/>
+              </a:rPr>
+              <a:t>script</a:t>
+            </a:r>
+            <a:r>
+              <a:rPr lang="da-DK" sz="1200" b="1">
+                <a:solidFill>
+                  <a:srgbClr val="808080"/>
+                </a:solidFill>
+                <a:latin typeface="Consolas" panose="020B0609020204030204" pitchFamily="49" charset="0"/>
+              </a:rPr>
+              <a:t>&gt;</a:t>
+            </a:r>
+            <a:endParaRPr lang="da-DK" sz="1200" b="1">
+              <a:solidFill>
+                <a:srgbClr val="D4D4D4"/>
+              </a:solidFill>
+              <a:latin typeface="Consolas" panose="020B0609020204030204" pitchFamily="49" charset="0"/>
+            </a:endParaRPr>
+          </a:p>
+          <a:p>
+            <a:pPr marL="0" indent="0">
+              <a:spcBef>
+                <a:spcPts val="0"/>
+              </a:spcBef>
+              <a:buNone/>
+            </a:pPr>
+            <a:r>
+              <a:rPr lang="da-DK" sz="1200" b="1">
+                <a:solidFill>
+                  <a:srgbClr val="808080"/>
+                </a:solidFill>
+                <a:latin typeface="Consolas" panose="020B0609020204030204" pitchFamily="49" charset="0"/>
+              </a:rPr>
+              <a:t>&lt;/</a:t>
+            </a:r>
+            <a:r>
+              <a:rPr lang="da-DK" sz="1200" b="1">
+                <a:solidFill>
+                  <a:srgbClr val="569CD6"/>
+                </a:solidFill>
+                <a:latin typeface="Consolas" panose="020B0609020204030204" pitchFamily="49" charset="0"/>
+              </a:rPr>
+              <a:t>body</a:t>
+            </a:r>
+            <a:r>
+              <a:rPr lang="da-DK" sz="1200" b="1">
+                <a:solidFill>
+                  <a:srgbClr val="808080"/>
+                </a:solidFill>
+                <a:latin typeface="Consolas" panose="020B0609020204030204" pitchFamily="49" charset="0"/>
+              </a:rPr>
+              <a:t>&gt;</a:t>
+            </a:r>
+            <a:endParaRPr lang="da-DK" sz="1200" b="1">
+              <a:solidFill>
+                <a:srgbClr val="D4D4D4"/>
+              </a:solidFill>
+              <a:latin typeface="Consolas" panose="020B0609020204030204" pitchFamily="49" charset="0"/>
+            </a:endParaRPr>
+          </a:p>
+          <a:p>
+            <a:pPr marL="0" indent="0">
+              <a:spcBef>
+                <a:spcPts val="0"/>
+              </a:spcBef>
+              <a:buNone/>
+            </a:pPr>
+            <a:r>
+              <a:rPr lang="da-DK" sz="1200" b="1">
+                <a:solidFill>
+                  <a:srgbClr val="D4D4D4"/>
+                </a:solidFill>
+                <a:latin typeface="Consolas" panose="020B0609020204030204" pitchFamily="49" charset="0"/>
+              </a:rPr>
+              <a:t/>
+            </a:r>
+            <a:br>
+              <a:rPr lang="da-DK" sz="1200" b="1">
+                <a:solidFill>
+                  <a:srgbClr val="D4D4D4"/>
+                </a:solidFill>
+                <a:latin typeface="Consolas" panose="020B0609020204030204" pitchFamily="49" charset="0"/>
+              </a:rPr>
+            </a:br>
+            <a:r>
+              <a:rPr lang="da-DK" sz="1200" b="1">
+                <a:solidFill>
+                  <a:srgbClr val="808080"/>
+                </a:solidFill>
+                <a:latin typeface="Consolas" panose="020B0609020204030204" pitchFamily="49" charset="0"/>
+              </a:rPr>
+              <a:t>&lt;/</a:t>
+            </a:r>
+            <a:r>
+              <a:rPr lang="da-DK" sz="1200" b="1">
+                <a:solidFill>
+                  <a:srgbClr val="569CD6"/>
+                </a:solidFill>
+                <a:latin typeface="Consolas" panose="020B0609020204030204" pitchFamily="49" charset="0"/>
+              </a:rPr>
+              <a:t>html</a:t>
+            </a:r>
+            <a:r>
+              <a:rPr lang="da-DK" sz="1200" b="1">
+                <a:solidFill>
+                  <a:srgbClr val="808080"/>
+                </a:solidFill>
+                <a:latin typeface="Consolas" panose="020B0609020204030204" pitchFamily="49" charset="0"/>
+              </a:rPr>
+              <a:t>&gt;</a:t>
+            </a:r>
+            <a:endParaRPr lang="da-DK" sz="1200" b="1">
+              <a:solidFill>
+                <a:srgbClr val="D4D4D4"/>
+              </a:solidFill>
+              <a:latin typeface="Consolas" panose="020B0609020204030204" pitchFamily="49" charset="0"/>
+            </a:endParaRPr>
+          </a:p>
+          <a:p>
+            <a:pPr marL="0" indent="0" eaLnBrk="0" fontAlgn="base" hangingPunct="0">
+              <a:lnSpc>
+                <a:spcPct val="100000"/>
+              </a:lnSpc>
+              <a:spcBef>
+                <a:spcPts val="0"/>
+              </a:spcBef>
+              <a:spcAft>
+                <a:spcPct val="0"/>
+              </a:spcAft>
+              <a:buNone/>
+            </a:pPr>
+            <a:endParaRPr kumimoji="0" lang="da-DK" altLang="da-DK" sz="1000" b="0" i="0" u="none" strike="noStrike" cap="none" normalizeH="0" baseline="0" smtClean="0">
+              <a:ln>
+                <a:noFill/>
+              </a:ln>
+              <a:solidFill>
+                <a:schemeClr val="tx1"/>
+              </a:solidFill>
+              <a:effectLst/>
+              <a:latin typeface="Arial" panose="020B0604020202020204" pitchFamily="34" charset="0"/>
+            </a:endParaRPr>
           </a:p>
         </p:txBody>
       </p:sp>
     </p:spTree>
     <p:extLst>
       <p:ext uri="{BB962C8B-B14F-4D97-AF65-F5344CB8AC3E}">
-        <p14:creationId xmlns:p14="http://schemas.microsoft.com/office/powerpoint/2010/main" val="1150086150"/>
+        <p14:creationId xmlns:p14="http://schemas.microsoft.com/office/powerpoint/2010/main" val="3028761909"/>
       </p:ext>
     </p:extLst>
   </p:cSld>
@@ -5664,784 +5697,6 @@
       </p:sp>
       <p:sp>
         <p:nvSpPr>
-          <p:cNvPr id="5" name="Tekstfelt 4"/>
-          <p:cNvSpPr txBox="1"/>
-          <p:nvPr/>
-        </p:nvSpPr>
-        <p:spPr>
-          <a:xfrm>
-            <a:off x="920578" y="1797907"/>
-            <a:ext cx="10886303" cy="2215991"/>
-          </a:xfrm>
-          <a:prstGeom prst="rect">
-            <a:avLst/>
-          </a:prstGeom>
-          <a:noFill/>
-        </p:spPr>
-        <p:txBody>
-          <a:bodyPr wrap="square" rtlCol="0">
-            <a:spAutoFit/>
-          </a:bodyPr>
-          <a:lstStyle/>
-          <a:p>
-            <a:r>
-              <a:rPr lang="da-DK" sz="1400" b="1">
-                <a:solidFill>
-                  <a:srgbClr val="808080"/>
-                </a:solidFill>
-                <a:latin typeface="Consolas" panose="020B0609020204030204" pitchFamily="49" charset="0"/>
-              </a:rPr>
-              <a:t>&lt;</a:t>
-            </a:r>
-            <a:r>
-              <a:rPr lang="da-DK" sz="1400" b="1">
-                <a:solidFill>
-                  <a:srgbClr val="569CD6"/>
-                </a:solidFill>
-                <a:latin typeface="Consolas" panose="020B0609020204030204" pitchFamily="49" charset="0"/>
-              </a:rPr>
-              <a:t>head</a:t>
-            </a:r>
-            <a:r>
-              <a:rPr lang="da-DK" sz="1400" b="1" smtClean="0">
-                <a:solidFill>
-                  <a:srgbClr val="808080"/>
-                </a:solidFill>
-                <a:latin typeface="Consolas" panose="020B0609020204030204" pitchFamily="49" charset="0"/>
-              </a:rPr>
-              <a:t>&gt;</a:t>
-            </a:r>
-          </a:p>
-          <a:p>
-            <a:endParaRPr lang="da-DK" sz="1400" b="1">
-              <a:solidFill>
-                <a:srgbClr val="808080"/>
-              </a:solidFill>
-              <a:latin typeface="Consolas" panose="020B0609020204030204" pitchFamily="49" charset="0"/>
-            </a:endParaRPr>
-          </a:p>
-          <a:p>
-            <a:endParaRPr lang="da-DK" sz="1400" b="1" smtClean="0">
-              <a:solidFill>
-                <a:srgbClr val="808080"/>
-              </a:solidFill>
-              <a:latin typeface="Consolas" panose="020B0609020204030204" pitchFamily="49" charset="0"/>
-            </a:endParaRPr>
-          </a:p>
-          <a:p>
-            <a:endParaRPr lang="da-DK" sz="1400" b="1">
-              <a:solidFill>
-                <a:srgbClr val="D4D4D4"/>
-              </a:solidFill>
-              <a:latin typeface="Consolas" panose="020B0609020204030204" pitchFamily="49" charset="0"/>
-            </a:endParaRPr>
-          </a:p>
-          <a:p>
-            <a:r>
-              <a:rPr lang="da-DK" sz="1400" b="1" smtClean="0">
-                <a:solidFill>
-                  <a:srgbClr val="808080"/>
-                </a:solidFill>
-                <a:latin typeface="Consolas" panose="020B0609020204030204" pitchFamily="49" charset="0"/>
-              </a:rPr>
-              <a:t>  &lt;</a:t>
-            </a:r>
-            <a:r>
-              <a:rPr lang="da-DK" sz="1400" b="1" smtClean="0">
-                <a:solidFill>
-                  <a:srgbClr val="569CD6"/>
-                </a:solidFill>
-                <a:latin typeface="Consolas" panose="020B0609020204030204" pitchFamily="49" charset="0"/>
-              </a:rPr>
-              <a:t>link</a:t>
-            </a:r>
-            <a:r>
-              <a:rPr lang="da-DK" sz="1400" b="1" smtClean="0">
-                <a:solidFill>
-                  <a:srgbClr val="D4D4D4"/>
-                </a:solidFill>
-                <a:latin typeface="Consolas" panose="020B0609020204030204" pitchFamily="49" charset="0"/>
-              </a:rPr>
-              <a:t> </a:t>
-            </a:r>
-            <a:r>
-              <a:rPr lang="da-DK" sz="1400" b="1" smtClean="0">
-                <a:solidFill>
-                  <a:srgbClr val="9CDCFE"/>
-                </a:solidFill>
-                <a:latin typeface="Consolas" panose="020B0609020204030204" pitchFamily="49" charset="0"/>
-              </a:rPr>
-              <a:t>rel</a:t>
-            </a:r>
-            <a:r>
-              <a:rPr lang="da-DK" sz="1400" b="1" smtClean="0">
-                <a:solidFill>
-                  <a:srgbClr val="D4D4D4"/>
-                </a:solidFill>
-                <a:latin typeface="Consolas" panose="020B0609020204030204" pitchFamily="49" charset="0"/>
-              </a:rPr>
-              <a:t>=</a:t>
-            </a:r>
-            <a:r>
-              <a:rPr lang="da-DK" sz="1400" b="1" smtClean="0">
-                <a:solidFill>
-                  <a:srgbClr val="CE9178"/>
-                </a:solidFill>
-                <a:latin typeface="Consolas" panose="020B0609020204030204" pitchFamily="49" charset="0"/>
-              </a:rPr>
-              <a:t>"stylesheet"</a:t>
-            </a:r>
-            <a:r>
-              <a:rPr lang="da-DK" sz="1400" b="1" smtClean="0">
-                <a:solidFill>
-                  <a:srgbClr val="D4D4D4"/>
-                </a:solidFill>
-                <a:latin typeface="Consolas" panose="020B0609020204030204" pitchFamily="49" charset="0"/>
-              </a:rPr>
-              <a:t> </a:t>
-            </a:r>
-            <a:r>
-              <a:rPr lang="da-DK" sz="1400" b="1" smtClean="0">
-                <a:solidFill>
-                  <a:srgbClr val="9CDCFE"/>
-                </a:solidFill>
-                <a:latin typeface="Consolas" panose="020B0609020204030204" pitchFamily="49" charset="0"/>
-              </a:rPr>
-              <a:t>href</a:t>
-            </a:r>
-            <a:r>
-              <a:rPr lang="da-DK" sz="1400" b="1" smtClean="0">
-                <a:solidFill>
-                  <a:srgbClr val="D4D4D4"/>
-                </a:solidFill>
-                <a:latin typeface="Consolas" panose="020B0609020204030204" pitchFamily="49" charset="0"/>
-              </a:rPr>
-              <a:t>=</a:t>
-            </a:r>
-            <a:r>
-              <a:rPr lang="da-DK" sz="1400" b="1" smtClean="0">
-                <a:solidFill>
-                  <a:srgbClr val="CE9178"/>
-                </a:solidFill>
-                <a:latin typeface="Consolas" panose="020B0609020204030204" pitchFamily="49" charset="0"/>
-              </a:rPr>
-              <a:t>"https://maxcdn.bootstrapcdn.com/bootstrap/4.2.1/css/bootstrap.min.css"</a:t>
-            </a:r>
-            <a:r>
-              <a:rPr lang="da-DK" sz="1400" b="1" smtClean="0">
-                <a:solidFill>
-                  <a:srgbClr val="808080"/>
-                </a:solidFill>
-                <a:latin typeface="Consolas" panose="020B0609020204030204" pitchFamily="49" charset="0"/>
-              </a:rPr>
-              <a:t>&gt;</a:t>
-            </a:r>
-            <a:endParaRPr lang="da-DK" sz="1400" b="1" smtClean="0">
-              <a:solidFill>
-                <a:srgbClr val="D4D4D4"/>
-              </a:solidFill>
-              <a:latin typeface="Consolas" panose="020B0609020204030204" pitchFamily="49" charset="0"/>
-            </a:endParaRPr>
-          </a:p>
-          <a:p>
-            <a:endParaRPr lang="da-DK" sz="1400" b="1" smtClean="0">
-              <a:solidFill>
-                <a:srgbClr val="808080"/>
-              </a:solidFill>
-              <a:latin typeface="Consolas" panose="020B0609020204030204" pitchFamily="49" charset="0"/>
-            </a:endParaRPr>
-          </a:p>
-          <a:p>
-            <a:endParaRPr lang="da-DK" sz="1400" b="1">
-              <a:solidFill>
-                <a:srgbClr val="808080"/>
-              </a:solidFill>
-              <a:latin typeface="Consolas" panose="020B0609020204030204" pitchFamily="49" charset="0"/>
-            </a:endParaRPr>
-          </a:p>
-          <a:p>
-            <a:endParaRPr lang="da-DK" sz="1400" b="1" smtClean="0">
-              <a:solidFill>
-                <a:srgbClr val="808080"/>
-              </a:solidFill>
-              <a:latin typeface="Consolas" panose="020B0609020204030204" pitchFamily="49" charset="0"/>
-            </a:endParaRPr>
-          </a:p>
-          <a:p>
-            <a:r>
-              <a:rPr lang="da-DK" sz="1400" b="1" smtClean="0">
-                <a:solidFill>
-                  <a:srgbClr val="808080"/>
-                </a:solidFill>
-                <a:latin typeface="Consolas" panose="020B0609020204030204" pitchFamily="49" charset="0"/>
-              </a:rPr>
-              <a:t>&lt;/</a:t>
-            </a:r>
-            <a:r>
-              <a:rPr lang="da-DK" sz="1400" b="1">
-                <a:solidFill>
-                  <a:srgbClr val="569CD6"/>
-                </a:solidFill>
-                <a:latin typeface="Consolas" panose="020B0609020204030204" pitchFamily="49" charset="0"/>
-              </a:rPr>
-              <a:t>head</a:t>
-            </a:r>
-            <a:r>
-              <a:rPr lang="da-DK" sz="1400" b="1">
-                <a:solidFill>
-                  <a:srgbClr val="808080"/>
-                </a:solidFill>
-                <a:latin typeface="Consolas" panose="020B0609020204030204" pitchFamily="49" charset="0"/>
-              </a:rPr>
-              <a:t>&gt;</a:t>
-            </a:r>
-            <a:endParaRPr lang="da-DK" sz="1400" b="1">
-              <a:solidFill>
-                <a:srgbClr val="D4D4D4"/>
-              </a:solidFill>
-              <a:latin typeface="Consolas" panose="020B0609020204030204" pitchFamily="49" charset="0"/>
-            </a:endParaRPr>
-          </a:p>
-          <a:p>
-            <a:endParaRPr lang="da-DK" sz="1200"/>
-          </a:p>
-        </p:txBody>
-      </p:sp>
-    </p:spTree>
-    <p:extLst>
-      <p:ext uri="{BB962C8B-B14F-4D97-AF65-F5344CB8AC3E}">
-        <p14:creationId xmlns:p14="http://schemas.microsoft.com/office/powerpoint/2010/main" val="1736674602"/>
-      </p:ext>
-    </p:extLst>
-  </p:cSld>
-  <p:clrMapOvr>
-    <a:masterClrMapping/>
-  </p:clrMapOvr>
-  <mc:AlternateContent xmlns:mc="http://schemas.openxmlformats.org/markup-compatibility/2006">
-    <mc:Choice xmlns:p14="http://schemas.microsoft.com/office/powerpoint/2010/main" Requires="p14">
-      <p:transition spd="med" p14:dur="700">
-        <p:fade/>
-      </p:transition>
-    </mc:Choice>
-    <mc:Fallback>
-      <p:transition spd="med">
-        <p:fade/>
-      </p:transition>
-    </mc:Fallback>
-  </mc:AlternateContent>
-  <p:timing>
-    <p:tnLst>
-      <p:par>
-        <p:cTn id="1" dur="indefinite" restart="never" nodeType="tmRoot"/>
-      </p:par>
-    </p:tnLst>
-  </p:timing>
-</p:sld>
-</file>
-
-<file path=ppt/slides/slide7.xml><?xml version="1.0" encoding="utf-8"?>
-<p:sld xmlns:a="http://schemas.openxmlformats.org/drawingml/2006/main" xmlns:r="http://schemas.openxmlformats.org/officeDocument/2006/relationships" xmlns:p="http://schemas.openxmlformats.org/presentationml/2006/main">
-  <p:cSld>
-    <p:spTree>
-      <p:nvGrpSpPr>
-        <p:cNvPr id="1" name=""/>
-        <p:cNvGrpSpPr/>
-        <p:nvPr/>
-      </p:nvGrpSpPr>
-      <p:grpSpPr>
-        <a:xfrm>
-          <a:off x="0" y="0"/>
-          <a:ext cx="0" cy="0"/>
-          <a:chOff x="0" y="0"/>
-          <a:chExt cx="0" cy="0"/>
-        </a:xfrm>
-      </p:grpSpPr>
-      <p:sp>
-        <p:nvSpPr>
-          <p:cNvPr id="2" name="Titel 1"/>
-          <p:cNvSpPr>
-            <a:spLocks noGrp="1"/>
-          </p:cNvSpPr>
-          <p:nvPr>
-            <p:ph type="title"/>
-          </p:nvPr>
-        </p:nvSpPr>
-        <p:spPr/>
-        <p:txBody>
-          <a:bodyPr/>
-          <a:lstStyle/>
-          <a:p>
-            <a:r>
-              <a:rPr lang="da-DK" b="1" smtClean="0"/>
-              <a:t>Getting started with Bootstrap</a:t>
-            </a:r>
-            <a:endParaRPr lang="da-DK" b="1"/>
-          </a:p>
-        </p:txBody>
-      </p:sp>
-      <p:sp>
-        <p:nvSpPr>
-          <p:cNvPr id="5" name="Tekstfelt 4"/>
-          <p:cNvSpPr txBox="1"/>
-          <p:nvPr/>
-        </p:nvSpPr>
-        <p:spPr>
-          <a:xfrm>
-            <a:off x="920578" y="1797907"/>
-            <a:ext cx="10886303" cy="2215991"/>
-          </a:xfrm>
-          <a:prstGeom prst="rect">
-            <a:avLst/>
-          </a:prstGeom>
-          <a:noFill/>
-        </p:spPr>
-        <p:txBody>
-          <a:bodyPr wrap="square" rtlCol="0">
-            <a:spAutoFit/>
-          </a:bodyPr>
-          <a:lstStyle/>
-          <a:p>
-            <a:r>
-              <a:rPr lang="da-DK" sz="1400" b="1">
-                <a:solidFill>
-                  <a:srgbClr val="808080"/>
-                </a:solidFill>
-                <a:latin typeface="Consolas" panose="020B0609020204030204" pitchFamily="49" charset="0"/>
-              </a:rPr>
-              <a:t>&lt;</a:t>
-            </a:r>
-            <a:r>
-              <a:rPr lang="da-DK" sz="1400" b="1">
-                <a:solidFill>
-                  <a:srgbClr val="569CD6"/>
-                </a:solidFill>
-                <a:latin typeface="Consolas" panose="020B0609020204030204" pitchFamily="49" charset="0"/>
-              </a:rPr>
-              <a:t>head</a:t>
-            </a:r>
-            <a:r>
-              <a:rPr lang="da-DK" sz="1400" b="1" smtClean="0">
-                <a:solidFill>
-                  <a:srgbClr val="808080"/>
-                </a:solidFill>
-                <a:latin typeface="Consolas" panose="020B0609020204030204" pitchFamily="49" charset="0"/>
-              </a:rPr>
-              <a:t>&gt;</a:t>
-            </a:r>
-          </a:p>
-          <a:p>
-            <a:endParaRPr lang="da-DK" sz="1400" b="1">
-              <a:solidFill>
-                <a:srgbClr val="808080"/>
-              </a:solidFill>
-              <a:latin typeface="Consolas" panose="020B0609020204030204" pitchFamily="49" charset="0"/>
-            </a:endParaRPr>
-          </a:p>
-          <a:p>
-            <a:endParaRPr lang="da-DK" sz="1400" b="1" smtClean="0">
-              <a:solidFill>
-                <a:srgbClr val="808080"/>
-              </a:solidFill>
-              <a:latin typeface="Consolas" panose="020B0609020204030204" pitchFamily="49" charset="0"/>
-            </a:endParaRPr>
-          </a:p>
-          <a:p>
-            <a:endParaRPr lang="da-DK" sz="1400" b="1">
-              <a:solidFill>
-                <a:srgbClr val="808080"/>
-              </a:solidFill>
-              <a:latin typeface="Consolas" panose="020B0609020204030204" pitchFamily="49" charset="0"/>
-            </a:endParaRPr>
-          </a:p>
-          <a:p>
-            <a:endParaRPr lang="da-DK" sz="1400" b="1">
-              <a:solidFill>
-                <a:srgbClr val="D4D4D4"/>
-              </a:solidFill>
-              <a:latin typeface="Consolas" panose="020B0609020204030204" pitchFamily="49" charset="0"/>
-            </a:endParaRPr>
-          </a:p>
-          <a:p>
-            <a:r>
-              <a:rPr lang="da-DK" sz="1400" b="1" smtClean="0">
-                <a:solidFill>
-                  <a:srgbClr val="808080"/>
-                </a:solidFill>
-                <a:latin typeface="Consolas" panose="020B0609020204030204" pitchFamily="49" charset="0"/>
-              </a:rPr>
-              <a:t>  &lt;</a:t>
-            </a:r>
-            <a:r>
-              <a:rPr lang="da-DK" sz="1400" b="1">
-                <a:solidFill>
-                  <a:srgbClr val="569CD6"/>
-                </a:solidFill>
-                <a:latin typeface="Consolas" panose="020B0609020204030204" pitchFamily="49" charset="0"/>
-              </a:rPr>
-              <a:t>script</a:t>
-            </a:r>
-            <a:r>
-              <a:rPr lang="da-DK" sz="1400" b="1">
-                <a:solidFill>
-                  <a:srgbClr val="D4D4D4"/>
-                </a:solidFill>
-                <a:latin typeface="Consolas" panose="020B0609020204030204" pitchFamily="49" charset="0"/>
-              </a:rPr>
-              <a:t> </a:t>
-            </a:r>
-            <a:r>
-              <a:rPr lang="da-DK" sz="1400" b="1">
-                <a:solidFill>
-                  <a:srgbClr val="9CDCFE"/>
-                </a:solidFill>
-                <a:latin typeface="Consolas" panose="020B0609020204030204" pitchFamily="49" charset="0"/>
-              </a:rPr>
-              <a:t>src</a:t>
-            </a:r>
-            <a:r>
-              <a:rPr lang="da-DK" sz="1400" b="1">
-                <a:solidFill>
-                  <a:srgbClr val="D4D4D4"/>
-                </a:solidFill>
-                <a:latin typeface="Consolas" panose="020B0609020204030204" pitchFamily="49" charset="0"/>
-              </a:rPr>
-              <a:t>=</a:t>
-            </a:r>
-            <a:r>
-              <a:rPr lang="da-DK" sz="1400" b="1">
-                <a:solidFill>
-                  <a:srgbClr val="CE9178"/>
-                </a:solidFill>
-                <a:latin typeface="Consolas" panose="020B0609020204030204" pitchFamily="49" charset="0"/>
-              </a:rPr>
-              <a:t>"https://ajax.googleapis.com/ajax/libs/jquery/3.3.1/jquery.min.js"</a:t>
-            </a:r>
-            <a:r>
-              <a:rPr lang="da-DK" sz="1400" b="1">
-                <a:solidFill>
-                  <a:srgbClr val="808080"/>
-                </a:solidFill>
-                <a:latin typeface="Consolas" panose="020B0609020204030204" pitchFamily="49" charset="0"/>
-              </a:rPr>
-              <a:t>&gt;&lt;/</a:t>
-            </a:r>
-            <a:r>
-              <a:rPr lang="da-DK" sz="1400" b="1">
-                <a:solidFill>
-                  <a:srgbClr val="569CD6"/>
-                </a:solidFill>
-                <a:latin typeface="Consolas" panose="020B0609020204030204" pitchFamily="49" charset="0"/>
-              </a:rPr>
-              <a:t>script</a:t>
-            </a:r>
-            <a:r>
-              <a:rPr lang="da-DK" sz="1400" b="1">
-                <a:solidFill>
-                  <a:srgbClr val="808080"/>
-                </a:solidFill>
-                <a:latin typeface="Consolas" panose="020B0609020204030204" pitchFamily="49" charset="0"/>
-              </a:rPr>
-              <a:t>&gt;</a:t>
-            </a:r>
-            <a:endParaRPr lang="da-DK" sz="1400" b="1">
-              <a:solidFill>
-                <a:srgbClr val="D4D4D4"/>
-              </a:solidFill>
-              <a:latin typeface="Consolas" panose="020B0609020204030204" pitchFamily="49" charset="0"/>
-            </a:endParaRPr>
-          </a:p>
-          <a:p>
-            <a:r>
-              <a:rPr lang="da-DK" sz="1400" b="1" smtClean="0">
-                <a:solidFill>
-                  <a:srgbClr val="808080"/>
-                </a:solidFill>
-                <a:latin typeface="Consolas" panose="020B0609020204030204" pitchFamily="49" charset="0"/>
-              </a:rPr>
-              <a:t>  &lt;</a:t>
-            </a:r>
-            <a:r>
-              <a:rPr lang="da-DK" sz="1400" b="1">
-                <a:solidFill>
-                  <a:srgbClr val="569CD6"/>
-                </a:solidFill>
-                <a:latin typeface="Consolas" panose="020B0609020204030204" pitchFamily="49" charset="0"/>
-              </a:rPr>
-              <a:t>script</a:t>
-            </a:r>
-            <a:r>
-              <a:rPr lang="da-DK" sz="1400" b="1">
-                <a:solidFill>
-                  <a:srgbClr val="D4D4D4"/>
-                </a:solidFill>
-                <a:latin typeface="Consolas" panose="020B0609020204030204" pitchFamily="49" charset="0"/>
-              </a:rPr>
-              <a:t> </a:t>
-            </a:r>
-            <a:r>
-              <a:rPr lang="da-DK" sz="1400" b="1">
-                <a:solidFill>
-                  <a:srgbClr val="9CDCFE"/>
-                </a:solidFill>
-                <a:latin typeface="Consolas" panose="020B0609020204030204" pitchFamily="49" charset="0"/>
-              </a:rPr>
-              <a:t>src</a:t>
-            </a:r>
-            <a:r>
-              <a:rPr lang="da-DK" sz="1400" b="1">
-                <a:solidFill>
-                  <a:srgbClr val="D4D4D4"/>
-                </a:solidFill>
-                <a:latin typeface="Consolas" panose="020B0609020204030204" pitchFamily="49" charset="0"/>
-              </a:rPr>
-              <a:t>=</a:t>
-            </a:r>
-            <a:r>
-              <a:rPr lang="da-DK" sz="1400" b="1">
-                <a:solidFill>
-                  <a:srgbClr val="CE9178"/>
-                </a:solidFill>
-                <a:latin typeface="Consolas" panose="020B0609020204030204" pitchFamily="49" charset="0"/>
-              </a:rPr>
-              <a:t>"https://cdnjs.cloudflare.com/ajax/libs/popper.js/1.14.6/umd/popper.min.js"</a:t>
-            </a:r>
-            <a:r>
-              <a:rPr lang="da-DK" sz="1400" b="1">
-                <a:solidFill>
-                  <a:srgbClr val="808080"/>
-                </a:solidFill>
-                <a:latin typeface="Consolas" panose="020B0609020204030204" pitchFamily="49" charset="0"/>
-              </a:rPr>
-              <a:t>&gt;&lt;/</a:t>
-            </a:r>
-            <a:r>
-              <a:rPr lang="da-DK" sz="1400" b="1">
-                <a:solidFill>
-                  <a:srgbClr val="569CD6"/>
-                </a:solidFill>
-                <a:latin typeface="Consolas" panose="020B0609020204030204" pitchFamily="49" charset="0"/>
-              </a:rPr>
-              <a:t>script</a:t>
-            </a:r>
-            <a:r>
-              <a:rPr lang="da-DK" sz="1400" b="1">
-                <a:solidFill>
-                  <a:srgbClr val="808080"/>
-                </a:solidFill>
-                <a:latin typeface="Consolas" panose="020B0609020204030204" pitchFamily="49" charset="0"/>
-              </a:rPr>
-              <a:t>&gt;</a:t>
-            </a:r>
-            <a:endParaRPr lang="da-DK" sz="1400" b="1">
-              <a:solidFill>
-                <a:srgbClr val="D4D4D4"/>
-              </a:solidFill>
-              <a:latin typeface="Consolas" panose="020B0609020204030204" pitchFamily="49" charset="0"/>
-            </a:endParaRPr>
-          </a:p>
-          <a:p>
-            <a:r>
-              <a:rPr lang="da-DK" sz="1400" b="1" smtClean="0">
-                <a:solidFill>
-                  <a:srgbClr val="808080"/>
-                </a:solidFill>
-                <a:latin typeface="Consolas" panose="020B0609020204030204" pitchFamily="49" charset="0"/>
-              </a:rPr>
-              <a:t>  &lt;</a:t>
-            </a:r>
-            <a:r>
-              <a:rPr lang="da-DK" sz="1400" b="1">
-                <a:solidFill>
-                  <a:srgbClr val="569CD6"/>
-                </a:solidFill>
-                <a:latin typeface="Consolas" panose="020B0609020204030204" pitchFamily="49" charset="0"/>
-              </a:rPr>
-              <a:t>script</a:t>
-            </a:r>
-            <a:r>
-              <a:rPr lang="da-DK" sz="1400" b="1">
-                <a:solidFill>
-                  <a:srgbClr val="D4D4D4"/>
-                </a:solidFill>
-                <a:latin typeface="Consolas" panose="020B0609020204030204" pitchFamily="49" charset="0"/>
-              </a:rPr>
-              <a:t> </a:t>
-            </a:r>
-            <a:r>
-              <a:rPr lang="da-DK" sz="1400" b="1">
-                <a:solidFill>
-                  <a:srgbClr val="9CDCFE"/>
-                </a:solidFill>
-                <a:latin typeface="Consolas" panose="020B0609020204030204" pitchFamily="49" charset="0"/>
-              </a:rPr>
-              <a:t>src</a:t>
-            </a:r>
-            <a:r>
-              <a:rPr lang="da-DK" sz="1400" b="1">
-                <a:solidFill>
-                  <a:srgbClr val="D4D4D4"/>
-                </a:solidFill>
-                <a:latin typeface="Consolas" panose="020B0609020204030204" pitchFamily="49" charset="0"/>
-              </a:rPr>
-              <a:t>=</a:t>
-            </a:r>
-            <a:r>
-              <a:rPr lang="da-DK" sz="1400" b="1">
-                <a:solidFill>
-                  <a:srgbClr val="CE9178"/>
-                </a:solidFill>
-                <a:latin typeface="Consolas" panose="020B0609020204030204" pitchFamily="49" charset="0"/>
-              </a:rPr>
-              <a:t>"https://maxcdn.bootstrapcdn.com/bootstrap/4.2.1/js/bootstrap.min.js"</a:t>
-            </a:r>
-            <a:r>
-              <a:rPr lang="da-DK" sz="1400" b="1">
-                <a:solidFill>
-                  <a:srgbClr val="808080"/>
-                </a:solidFill>
-                <a:latin typeface="Consolas" panose="020B0609020204030204" pitchFamily="49" charset="0"/>
-              </a:rPr>
-              <a:t>&gt;&lt;/</a:t>
-            </a:r>
-            <a:r>
-              <a:rPr lang="da-DK" sz="1400" b="1">
-                <a:solidFill>
-                  <a:srgbClr val="569CD6"/>
-                </a:solidFill>
-                <a:latin typeface="Consolas" panose="020B0609020204030204" pitchFamily="49" charset="0"/>
-              </a:rPr>
-              <a:t>script</a:t>
-            </a:r>
-            <a:r>
-              <a:rPr lang="da-DK" sz="1400" b="1" smtClean="0">
-                <a:solidFill>
-                  <a:srgbClr val="808080"/>
-                </a:solidFill>
-                <a:latin typeface="Consolas" panose="020B0609020204030204" pitchFamily="49" charset="0"/>
-              </a:rPr>
-              <a:t>&gt;</a:t>
-            </a:r>
-            <a:endParaRPr lang="da-DK" sz="1400" b="1" smtClean="0">
-              <a:solidFill>
-                <a:srgbClr val="D4D4D4"/>
-              </a:solidFill>
-              <a:latin typeface="Consolas" panose="020B0609020204030204" pitchFamily="49" charset="0"/>
-            </a:endParaRPr>
-          </a:p>
-          <a:p>
-            <a:r>
-              <a:rPr lang="da-DK" sz="1400" b="1" smtClean="0">
-                <a:solidFill>
-                  <a:srgbClr val="808080"/>
-                </a:solidFill>
-                <a:latin typeface="Consolas" panose="020B0609020204030204" pitchFamily="49" charset="0"/>
-              </a:rPr>
-              <a:t>&lt;/</a:t>
-            </a:r>
-            <a:r>
-              <a:rPr lang="da-DK" sz="1400" b="1" smtClean="0">
-                <a:solidFill>
-                  <a:srgbClr val="569CD6"/>
-                </a:solidFill>
-                <a:latin typeface="Consolas" panose="020B0609020204030204" pitchFamily="49" charset="0"/>
-              </a:rPr>
-              <a:t>head</a:t>
-            </a:r>
-            <a:r>
-              <a:rPr lang="da-DK" sz="1400" b="1" smtClean="0">
-                <a:solidFill>
-                  <a:srgbClr val="808080"/>
-                </a:solidFill>
-                <a:latin typeface="Consolas" panose="020B0609020204030204" pitchFamily="49" charset="0"/>
-              </a:rPr>
-              <a:t>&gt;</a:t>
-            </a:r>
-            <a:endParaRPr lang="da-DK" sz="1400" b="1" smtClean="0">
-              <a:solidFill>
-                <a:srgbClr val="D4D4D4"/>
-              </a:solidFill>
-              <a:latin typeface="Consolas" panose="020B0609020204030204" pitchFamily="49" charset="0"/>
-            </a:endParaRPr>
-          </a:p>
-          <a:p>
-            <a:endParaRPr lang="da-DK" sz="1200"/>
-          </a:p>
-        </p:txBody>
-      </p:sp>
-    </p:spTree>
-    <p:extLst>
-      <p:ext uri="{BB962C8B-B14F-4D97-AF65-F5344CB8AC3E}">
-        <p14:creationId xmlns:p14="http://schemas.microsoft.com/office/powerpoint/2010/main" val="232986925"/>
-      </p:ext>
-    </p:extLst>
-  </p:cSld>
-  <p:clrMapOvr>
-    <a:masterClrMapping/>
-  </p:clrMapOvr>
-  <mc:AlternateContent xmlns:mc="http://schemas.openxmlformats.org/markup-compatibility/2006">
-    <mc:Choice xmlns:p14="http://schemas.microsoft.com/office/powerpoint/2010/main" Requires="p14">
-      <p:transition spd="med" p14:dur="700">
-        <p:fade/>
-      </p:transition>
-    </mc:Choice>
-    <mc:Fallback>
-      <p:transition spd="med">
-        <p:fade/>
-      </p:transition>
-    </mc:Fallback>
-  </mc:AlternateContent>
-  <p:timing>
-    <p:tnLst>
-      <p:par>
-        <p:cTn id="1" dur="indefinite" restart="never" nodeType="tmRoot"/>
-      </p:par>
-    </p:tnLst>
-  </p:timing>
-</p:sld>
-</file>
-
-<file path=ppt/slides/slide8.xml><?xml version="1.0" encoding="utf-8"?>
-<p:sld xmlns:a="http://schemas.openxmlformats.org/drawingml/2006/main" xmlns:r="http://schemas.openxmlformats.org/officeDocument/2006/relationships" xmlns:p="http://schemas.openxmlformats.org/presentationml/2006/main">
-  <p:cSld>
-    <p:spTree>
-      <p:nvGrpSpPr>
-        <p:cNvPr id="1" name=""/>
-        <p:cNvGrpSpPr/>
-        <p:nvPr/>
-      </p:nvGrpSpPr>
-      <p:grpSpPr>
-        <a:xfrm>
-          <a:off x="0" y="0"/>
-          <a:ext cx="0" cy="0"/>
-          <a:chOff x="0" y="0"/>
-          <a:chExt cx="0" cy="0"/>
-        </a:xfrm>
-      </p:grpSpPr>
-      <p:sp>
-        <p:nvSpPr>
-          <p:cNvPr id="2" name="Titel 1"/>
-          <p:cNvSpPr>
-            <a:spLocks noGrp="1"/>
-          </p:cNvSpPr>
-          <p:nvPr>
-            <p:ph type="title"/>
-          </p:nvPr>
-        </p:nvSpPr>
-        <p:spPr/>
-        <p:txBody>
-          <a:bodyPr/>
-          <a:lstStyle/>
-          <a:p>
-            <a:r>
-              <a:rPr lang="da-DK" b="1" smtClean="0"/>
-              <a:t>Getting started with Bootstrap</a:t>
-            </a:r>
-            <a:endParaRPr lang="da-DK" b="1"/>
-          </a:p>
-        </p:txBody>
-      </p:sp>
-      <p:sp>
-        <p:nvSpPr>
           <p:cNvPr id="3" name="Pladsholder til indhold 2"/>
           <p:cNvSpPr>
             <a:spLocks noGrp="1"/>
@@ -6479,13 +5734,7 @@
               <a:rPr lang="da-DK" sz="2000">
                 <a:hlinkClick r:id="rId2"/>
               </a:rPr>
-              <a:t>https://</a:t>
-            </a:r>
-            <a:r>
-              <a:rPr lang="da-DK" sz="2000">
-                <a:hlinkClick r:id="rId2"/>
-              </a:rPr>
-              <a:t>getbootstrap.com/docs/4.0/content/reboot</a:t>
+              <a:t>https://getbootstrap.com/docs/4.0/content/reboot</a:t>
             </a:r>
             <a:r>
               <a:rPr lang="da-DK" sz="2000" smtClean="0">
@@ -6556,7 +5805,7 @@
 </p:sld>
 </file>
 
-<file path=ppt/slides/slide9.xml><?xml version="1.0" encoding="utf-8"?>
+<file path=ppt/slides/slide7.xml><?xml version="1.0" encoding="utf-8"?>
 <p:sld xmlns:a="http://schemas.openxmlformats.org/drawingml/2006/main" xmlns:r="http://schemas.openxmlformats.org/officeDocument/2006/relationships" xmlns:p="http://schemas.openxmlformats.org/presentationml/2006/main">
   <p:cSld>
     <p:spTree>
@@ -6726,6 +5975,700 @@
   <p:clrMapOvr>
     <a:masterClrMapping/>
   </p:clrMapOvr>
+  <p:timing>
+    <p:tnLst>
+      <p:par>
+        <p:cTn id="1" dur="indefinite" restart="never" nodeType="tmRoot"/>
+      </p:par>
+    </p:tnLst>
+  </p:timing>
+</p:sld>
+</file>
+
+<file path=ppt/slides/slide8.xml><?xml version="1.0" encoding="utf-8"?>
+<p:sld xmlns:a="http://schemas.openxmlformats.org/drawingml/2006/main" xmlns:r="http://schemas.openxmlformats.org/officeDocument/2006/relationships" xmlns:p="http://schemas.openxmlformats.org/presentationml/2006/main">
+  <p:cSld>
+    <p:spTree>
+      <p:nvGrpSpPr>
+        <p:cNvPr id="1" name=""/>
+        <p:cNvGrpSpPr/>
+        <p:nvPr/>
+      </p:nvGrpSpPr>
+      <p:grpSpPr>
+        <a:xfrm>
+          <a:off x="0" y="0"/>
+          <a:ext cx="0" cy="0"/>
+          <a:chOff x="0" y="0"/>
+          <a:chExt cx="0" cy="0"/>
+        </a:xfrm>
+      </p:grpSpPr>
+      <p:sp>
+        <p:nvSpPr>
+          <p:cNvPr id="2" name="Titel 1"/>
+          <p:cNvSpPr>
+            <a:spLocks noGrp="1"/>
+          </p:cNvSpPr>
+          <p:nvPr>
+            <p:ph type="title"/>
+          </p:nvPr>
+        </p:nvSpPr>
+        <p:spPr/>
+        <p:txBody>
+          <a:bodyPr/>
+          <a:lstStyle/>
+          <a:p>
+            <a:r>
+              <a:rPr lang="da-DK" b="1"/>
+              <a:t>Bootstrap, styling with classes</a:t>
+            </a:r>
+          </a:p>
+        </p:txBody>
+      </p:sp>
+      <p:sp>
+        <p:nvSpPr>
+          <p:cNvPr id="5" name="Tekstfelt 4"/>
+          <p:cNvSpPr txBox="1"/>
+          <p:nvPr/>
+        </p:nvSpPr>
+        <p:spPr>
+          <a:xfrm>
+            <a:off x="920578" y="1797907"/>
+            <a:ext cx="10886303" cy="2462213"/>
+          </a:xfrm>
+          <a:prstGeom prst="rect">
+            <a:avLst/>
+          </a:prstGeom>
+          <a:noFill/>
+        </p:spPr>
+        <p:txBody>
+          <a:bodyPr wrap="square" rtlCol="0">
+            <a:spAutoFit/>
+          </a:bodyPr>
+          <a:lstStyle/>
+          <a:p>
+            <a:r>
+              <a:rPr lang="en-US" sz="3200" b="1" smtClean="0">
+                <a:solidFill>
+                  <a:srgbClr val="808080"/>
+                </a:solidFill>
+                <a:latin typeface="Consolas" panose="020B0609020204030204" pitchFamily="49" charset="0"/>
+              </a:rPr>
+              <a:t>&lt;</a:t>
+            </a:r>
+            <a:r>
+              <a:rPr lang="en-US" sz="3200" b="1" smtClean="0">
+                <a:solidFill>
+                  <a:srgbClr val="569CD6"/>
+                </a:solidFill>
+                <a:latin typeface="Consolas" panose="020B0609020204030204" pitchFamily="49" charset="0"/>
+              </a:rPr>
+              <a:t>div</a:t>
+            </a:r>
+            <a:r>
+              <a:rPr lang="en-US" sz="3200" b="1" smtClean="0">
+                <a:solidFill>
+                  <a:srgbClr val="808080"/>
+                </a:solidFill>
+                <a:latin typeface="Consolas" panose="020B0609020204030204" pitchFamily="49" charset="0"/>
+              </a:rPr>
+              <a:t>&gt;</a:t>
+            </a:r>
+            <a:r>
+              <a:rPr lang="en-US" sz="3200" b="1" smtClean="0">
+                <a:solidFill>
+                  <a:srgbClr val="D4D4D4"/>
+                </a:solidFill>
+                <a:latin typeface="Consolas" panose="020B0609020204030204" pitchFamily="49" charset="0"/>
+              </a:rPr>
+              <a:t> </a:t>
+            </a:r>
+            <a:endParaRPr lang="en-US" sz="3200" b="1">
+              <a:solidFill>
+                <a:srgbClr val="D4D4D4"/>
+              </a:solidFill>
+              <a:latin typeface="Consolas" panose="020B0609020204030204" pitchFamily="49" charset="0"/>
+            </a:endParaRPr>
+          </a:p>
+          <a:p>
+            <a:r>
+              <a:rPr lang="en-US" sz="3200" b="1">
+                <a:solidFill>
+                  <a:srgbClr val="808080"/>
+                </a:solidFill>
+                <a:latin typeface="Consolas" panose="020B0609020204030204" pitchFamily="49" charset="0"/>
+              </a:rPr>
+              <a:t> </a:t>
+            </a:r>
+            <a:r>
+              <a:rPr lang="en-US" sz="3200" b="1" smtClean="0">
+                <a:solidFill>
+                  <a:srgbClr val="808080"/>
+                </a:solidFill>
+                <a:latin typeface="Consolas" panose="020B0609020204030204" pitchFamily="49" charset="0"/>
+              </a:rPr>
+              <a:t> &lt;</a:t>
+            </a:r>
+            <a:r>
+              <a:rPr lang="en-US" sz="3200" b="1">
+                <a:solidFill>
+                  <a:srgbClr val="569CD6"/>
+                </a:solidFill>
+                <a:latin typeface="Consolas" panose="020B0609020204030204" pitchFamily="49" charset="0"/>
+              </a:rPr>
+              <a:t>h1</a:t>
+            </a:r>
+            <a:r>
+              <a:rPr lang="en-US" sz="3200" b="1">
+                <a:solidFill>
+                  <a:srgbClr val="808080"/>
+                </a:solidFill>
+                <a:latin typeface="Consolas" panose="020B0609020204030204" pitchFamily="49" charset="0"/>
+              </a:rPr>
+              <a:t>&gt;</a:t>
+            </a:r>
+            <a:r>
+              <a:rPr lang="en-US" sz="3200" b="1">
+                <a:solidFill>
+                  <a:srgbClr val="D4D4D4"/>
+                </a:solidFill>
+                <a:latin typeface="Consolas" panose="020B0609020204030204" pitchFamily="49" charset="0"/>
+              </a:rPr>
+              <a:t>This is a Level 1 Heading</a:t>
+            </a:r>
+            <a:r>
+              <a:rPr lang="en-US" sz="3200" b="1">
+                <a:solidFill>
+                  <a:srgbClr val="808080"/>
+                </a:solidFill>
+                <a:latin typeface="Consolas" panose="020B0609020204030204" pitchFamily="49" charset="0"/>
+              </a:rPr>
+              <a:t>&lt;/</a:t>
+            </a:r>
+            <a:r>
+              <a:rPr lang="en-US" sz="3200" b="1">
+                <a:solidFill>
+                  <a:srgbClr val="569CD6"/>
+                </a:solidFill>
+                <a:latin typeface="Consolas" panose="020B0609020204030204" pitchFamily="49" charset="0"/>
+              </a:rPr>
+              <a:t>h1</a:t>
+            </a:r>
+            <a:r>
+              <a:rPr lang="en-US" sz="3200" b="1">
+                <a:solidFill>
+                  <a:srgbClr val="808080"/>
+                </a:solidFill>
+                <a:latin typeface="Consolas" panose="020B0609020204030204" pitchFamily="49" charset="0"/>
+              </a:rPr>
+              <a:t>&gt;</a:t>
+            </a:r>
+            <a:endParaRPr lang="en-US" sz="3200" b="1">
+              <a:solidFill>
+                <a:srgbClr val="D4D4D4"/>
+              </a:solidFill>
+              <a:latin typeface="Consolas" panose="020B0609020204030204" pitchFamily="49" charset="0"/>
+            </a:endParaRPr>
+          </a:p>
+          <a:p>
+            <a:r>
+              <a:rPr lang="en-US" sz="3200" b="1" smtClean="0">
+                <a:solidFill>
+                  <a:srgbClr val="808080"/>
+                </a:solidFill>
+                <a:latin typeface="Consolas" panose="020B0609020204030204" pitchFamily="49" charset="0"/>
+              </a:rPr>
+              <a:t>  &lt;</a:t>
+            </a:r>
+            <a:r>
+              <a:rPr lang="en-US" sz="3200" b="1">
+                <a:solidFill>
+                  <a:srgbClr val="569CD6"/>
+                </a:solidFill>
+                <a:latin typeface="Consolas" panose="020B0609020204030204" pitchFamily="49" charset="0"/>
+              </a:rPr>
+              <a:t>p</a:t>
+            </a:r>
+            <a:r>
+              <a:rPr lang="en-US" sz="3200" b="1">
+                <a:solidFill>
+                  <a:srgbClr val="808080"/>
+                </a:solidFill>
+                <a:latin typeface="Consolas" panose="020B0609020204030204" pitchFamily="49" charset="0"/>
+              </a:rPr>
+              <a:t>&gt;</a:t>
+            </a:r>
+            <a:r>
+              <a:rPr lang="en-US" sz="3200" b="1">
+                <a:solidFill>
+                  <a:srgbClr val="D4D4D4"/>
+                </a:solidFill>
+                <a:latin typeface="Consolas" panose="020B0609020204030204" pitchFamily="49" charset="0"/>
+              </a:rPr>
+              <a:t>This is some text.</a:t>
+            </a:r>
+            <a:r>
+              <a:rPr lang="en-US" sz="3200" b="1">
+                <a:solidFill>
+                  <a:srgbClr val="808080"/>
+                </a:solidFill>
+                <a:latin typeface="Consolas" panose="020B0609020204030204" pitchFamily="49" charset="0"/>
+              </a:rPr>
+              <a:t>&lt;/</a:t>
+            </a:r>
+            <a:r>
+              <a:rPr lang="en-US" sz="3200" b="1">
+                <a:solidFill>
+                  <a:srgbClr val="569CD6"/>
+                </a:solidFill>
+                <a:latin typeface="Consolas" panose="020B0609020204030204" pitchFamily="49" charset="0"/>
+              </a:rPr>
+              <a:t>p</a:t>
+            </a:r>
+            <a:r>
+              <a:rPr lang="en-US" sz="3200" b="1">
+                <a:solidFill>
+                  <a:srgbClr val="808080"/>
+                </a:solidFill>
+                <a:latin typeface="Consolas" panose="020B0609020204030204" pitchFamily="49" charset="0"/>
+              </a:rPr>
+              <a:t>&gt;</a:t>
+            </a:r>
+            <a:r>
+              <a:rPr lang="en-US" sz="3200" b="1">
+                <a:solidFill>
+                  <a:srgbClr val="D4D4D4"/>
+                </a:solidFill>
+                <a:latin typeface="Consolas" panose="020B0609020204030204" pitchFamily="49" charset="0"/>
+              </a:rPr>
+              <a:t> </a:t>
+            </a:r>
+          </a:p>
+          <a:p>
+            <a:r>
+              <a:rPr lang="en-US" sz="3200" b="1">
+                <a:solidFill>
+                  <a:srgbClr val="808080"/>
+                </a:solidFill>
+                <a:latin typeface="Consolas" panose="020B0609020204030204" pitchFamily="49" charset="0"/>
+              </a:rPr>
+              <a:t>&lt;/</a:t>
+            </a:r>
+            <a:r>
+              <a:rPr lang="en-US" sz="3200" b="1">
+                <a:solidFill>
+                  <a:srgbClr val="569CD6"/>
+                </a:solidFill>
+                <a:latin typeface="Consolas" panose="020B0609020204030204" pitchFamily="49" charset="0"/>
+              </a:rPr>
+              <a:t>div</a:t>
+            </a:r>
+            <a:r>
+              <a:rPr lang="en-US" sz="3200" b="1">
+                <a:solidFill>
+                  <a:srgbClr val="808080"/>
+                </a:solidFill>
+                <a:latin typeface="Consolas" panose="020B0609020204030204" pitchFamily="49" charset="0"/>
+              </a:rPr>
+              <a:t>&gt;</a:t>
+            </a:r>
+            <a:endParaRPr lang="en-US" sz="3200" b="1">
+              <a:solidFill>
+                <a:srgbClr val="D4D4D4"/>
+              </a:solidFill>
+              <a:latin typeface="Consolas" panose="020B0609020204030204" pitchFamily="49" charset="0"/>
+            </a:endParaRPr>
+          </a:p>
+          <a:p>
+            <a:endParaRPr lang="da-DK" sz="1400" b="1" smtClean="0">
+              <a:solidFill>
+                <a:srgbClr val="D4D4D4"/>
+              </a:solidFill>
+              <a:latin typeface="Consolas" panose="020B0609020204030204" pitchFamily="49" charset="0"/>
+            </a:endParaRPr>
+          </a:p>
+          <a:p>
+            <a:endParaRPr lang="da-DK" sz="1200"/>
+          </a:p>
+        </p:txBody>
+      </p:sp>
+    </p:spTree>
+    <p:extLst>
+      <p:ext uri="{BB962C8B-B14F-4D97-AF65-F5344CB8AC3E}">
+        <p14:creationId xmlns:p14="http://schemas.microsoft.com/office/powerpoint/2010/main" val="1814157107"/>
+      </p:ext>
+    </p:extLst>
+  </p:cSld>
+  <p:clrMapOvr>
+    <a:masterClrMapping/>
+  </p:clrMapOvr>
+  <p:timing>
+    <p:tnLst>
+      <p:par>
+        <p:cTn id="1" dur="indefinite" restart="never" nodeType="tmRoot"/>
+      </p:par>
+    </p:tnLst>
+  </p:timing>
+</p:sld>
+</file>
+
+<file path=ppt/slides/slide9.xml><?xml version="1.0" encoding="utf-8"?>
+<p:sld xmlns:a="http://schemas.openxmlformats.org/drawingml/2006/main" xmlns:r="http://schemas.openxmlformats.org/officeDocument/2006/relationships" xmlns:p="http://schemas.openxmlformats.org/presentationml/2006/main">
+  <p:cSld>
+    <p:spTree>
+      <p:nvGrpSpPr>
+        <p:cNvPr id="1" name=""/>
+        <p:cNvGrpSpPr/>
+        <p:nvPr/>
+      </p:nvGrpSpPr>
+      <p:grpSpPr>
+        <a:xfrm>
+          <a:off x="0" y="0"/>
+          <a:ext cx="0" cy="0"/>
+          <a:chOff x="0" y="0"/>
+          <a:chExt cx="0" cy="0"/>
+        </a:xfrm>
+      </p:grpSpPr>
+      <p:sp>
+        <p:nvSpPr>
+          <p:cNvPr id="2" name="Titel 1"/>
+          <p:cNvSpPr>
+            <a:spLocks noGrp="1"/>
+          </p:cNvSpPr>
+          <p:nvPr>
+            <p:ph type="title"/>
+          </p:nvPr>
+        </p:nvSpPr>
+        <p:spPr/>
+        <p:txBody>
+          <a:bodyPr/>
+          <a:lstStyle/>
+          <a:p>
+            <a:r>
+              <a:rPr lang="da-DK" b="1"/>
+              <a:t>Bootstrap, styling with classes</a:t>
+            </a:r>
+          </a:p>
+        </p:txBody>
+      </p:sp>
+      <p:sp>
+        <p:nvSpPr>
+          <p:cNvPr id="5" name="Tekstfelt 4"/>
+          <p:cNvSpPr txBox="1"/>
+          <p:nvPr/>
+        </p:nvSpPr>
+        <p:spPr>
+          <a:xfrm>
+            <a:off x="920578" y="1797907"/>
+            <a:ext cx="10886303" cy="2462213"/>
+          </a:xfrm>
+          <a:prstGeom prst="rect">
+            <a:avLst/>
+          </a:prstGeom>
+          <a:noFill/>
+        </p:spPr>
+        <p:txBody>
+          <a:bodyPr wrap="square" rtlCol="0">
+            <a:spAutoFit/>
+          </a:bodyPr>
+          <a:lstStyle/>
+          <a:p>
+            <a:r>
+              <a:rPr lang="en-US" sz="3200" b="1" smtClean="0">
+                <a:solidFill>
+                  <a:srgbClr val="808080"/>
+                </a:solidFill>
+                <a:latin typeface="Consolas" panose="020B0609020204030204" pitchFamily="49" charset="0"/>
+              </a:rPr>
+              <a:t>&lt;</a:t>
+            </a:r>
+            <a:r>
+              <a:rPr lang="en-US" sz="3200" b="1">
+                <a:solidFill>
+                  <a:srgbClr val="569CD6"/>
+                </a:solidFill>
+                <a:latin typeface="Consolas" panose="020B0609020204030204" pitchFamily="49" charset="0"/>
+              </a:rPr>
+              <a:t>div</a:t>
+            </a:r>
+            <a:r>
+              <a:rPr lang="en-US" sz="3200" b="1">
+                <a:solidFill>
+                  <a:srgbClr val="D4D4D4"/>
+                </a:solidFill>
+                <a:latin typeface="Consolas" panose="020B0609020204030204" pitchFamily="49" charset="0"/>
+              </a:rPr>
+              <a:t> </a:t>
+            </a:r>
+            <a:r>
+              <a:rPr lang="en-US" sz="3200" b="1">
+                <a:solidFill>
+                  <a:srgbClr val="9CDCFE"/>
+                </a:solidFill>
+                <a:latin typeface="Consolas" panose="020B0609020204030204" pitchFamily="49" charset="0"/>
+              </a:rPr>
+              <a:t>class</a:t>
+            </a:r>
+            <a:r>
+              <a:rPr lang="en-US" sz="3200" b="1">
+                <a:solidFill>
+                  <a:srgbClr val="D4D4D4"/>
+                </a:solidFill>
+                <a:latin typeface="Consolas" panose="020B0609020204030204" pitchFamily="49" charset="0"/>
+              </a:rPr>
+              <a:t>=</a:t>
+            </a:r>
+            <a:r>
+              <a:rPr lang="en-US" sz="3200" b="1">
+                <a:solidFill>
+                  <a:srgbClr val="CE9178"/>
+                </a:solidFill>
+                <a:latin typeface="Consolas" panose="020B0609020204030204" pitchFamily="49" charset="0"/>
+              </a:rPr>
+              <a:t>"container"</a:t>
+            </a:r>
+            <a:r>
+              <a:rPr lang="en-US" sz="3200" b="1">
+                <a:solidFill>
+                  <a:srgbClr val="808080"/>
+                </a:solidFill>
+                <a:latin typeface="Consolas" panose="020B0609020204030204" pitchFamily="49" charset="0"/>
+              </a:rPr>
+              <a:t>&gt;</a:t>
+            </a:r>
+            <a:r>
+              <a:rPr lang="en-US" sz="3200" b="1">
+                <a:solidFill>
+                  <a:srgbClr val="D4D4D4"/>
+                </a:solidFill>
+                <a:latin typeface="Consolas" panose="020B0609020204030204" pitchFamily="49" charset="0"/>
+              </a:rPr>
+              <a:t> </a:t>
+            </a:r>
+          </a:p>
+          <a:p>
+            <a:r>
+              <a:rPr lang="en-US" sz="3200" b="1">
+                <a:solidFill>
+                  <a:srgbClr val="808080"/>
+                </a:solidFill>
+                <a:latin typeface="Consolas" panose="020B0609020204030204" pitchFamily="49" charset="0"/>
+              </a:rPr>
+              <a:t> </a:t>
+            </a:r>
+            <a:r>
+              <a:rPr lang="en-US" sz="3200" b="1" smtClean="0">
+                <a:solidFill>
+                  <a:srgbClr val="808080"/>
+                </a:solidFill>
+                <a:latin typeface="Consolas" panose="020B0609020204030204" pitchFamily="49" charset="0"/>
+              </a:rPr>
+              <a:t> &lt;</a:t>
+            </a:r>
+            <a:r>
+              <a:rPr lang="en-US" sz="3200" b="1">
+                <a:solidFill>
+                  <a:srgbClr val="569CD6"/>
+                </a:solidFill>
+                <a:latin typeface="Consolas" panose="020B0609020204030204" pitchFamily="49" charset="0"/>
+              </a:rPr>
+              <a:t>h1</a:t>
+            </a:r>
+            <a:r>
+              <a:rPr lang="en-US" sz="3200" b="1">
+                <a:solidFill>
+                  <a:srgbClr val="808080"/>
+                </a:solidFill>
+                <a:latin typeface="Consolas" panose="020B0609020204030204" pitchFamily="49" charset="0"/>
+              </a:rPr>
+              <a:t>&gt;</a:t>
+            </a:r>
+            <a:r>
+              <a:rPr lang="en-US" sz="3200" b="1">
+                <a:solidFill>
+                  <a:srgbClr val="D4D4D4"/>
+                </a:solidFill>
+                <a:latin typeface="Consolas" panose="020B0609020204030204" pitchFamily="49" charset="0"/>
+              </a:rPr>
+              <a:t>This is a Level 1 Heading</a:t>
+            </a:r>
+            <a:r>
+              <a:rPr lang="en-US" sz="3200" b="1">
+                <a:solidFill>
+                  <a:srgbClr val="808080"/>
+                </a:solidFill>
+                <a:latin typeface="Consolas" panose="020B0609020204030204" pitchFamily="49" charset="0"/>
+              </a:rPr>
+              <a:t>&lt;/</a:t>
+            </a:r>
+            <a:r>
+              <a:rPr lang="en-US" sz="3200" b="1">
+                <a:solidFill>
+                  <a:srgbClr val="569CD6"/>
+                </a:solidFill>
+                <a:latin typeface="Consolas" panose="020B0609020204030204" pitchFamily="49" charset="0"/>
+              </a:rPr>
+              <a:t>h1</a:t>
+            </a:r>
+            <a:r>
+              <a:rPr lang="en-US" sz="3200" b="1">
+                <a:solidFill>
+                  <a:srgbClr val="808080"/>
+                </a:solidFill>
+                <a:latin typeface="Consolas" panose="020B0609020204030204" pitchFamily="49" charset="0"/>
+              </a:rPr>
+              <a:t>&gt;</a:t>
+            </a:r>
+            <a:endParaRPr lang="en-US" sz="3200" b="1">
+              <a:solidFill>
+                <a:srgbClr val="D4D4D4"/>
+              </a:solidFill>
+              <a:latin typeface="Consolas" panose="020B0609020204030204" pitchFamily="49" charset="0"/>
+            </a:endParaRPr>
+          </a:p>
+          <a:p>
+            <a:r>
+              <a:rPr lang="en-US" sz="3200" b="1" smtClean="0">
+                <a:solidFill>
+                  <a:srgbClr val="808080"/>
+                </a:solidFill>
+                <a:latin typeface="Consolas" panose="020B0609020204030204" pitchFamily="49" charset="0"/>
+              </a:rPr>
+              <a:t>  &lt;</a:t>
+            </a:r>
+            <a:r>
+              <a:rPr lang="en-US" sz="3200" b="1">
+                <a:solidFill>
+                  <a:srgbClr val="569CD6"/>
+                </a:solidFill>
+                <a:latin typeface="Consolas" panose="020B0609020204030204" pitchFamily="49" charset="0"/>
+              </a:rPr>
+              <a:t>p</a:t>
+            </a:r>
+            <a:r>
+              <a:rPr lang="en-US" sz="3200" b="1">
+                <a:solidFill>
+                  <a:srgbClr val="808080"/>
+                </a:solidFill>
+                <a:latin typeface="Consolas" panose="020B0609020204030204" pitchFamily="49" charset="0"/>
+              </a:rPr>
+              <a:t>&gt;</a:t>
+            </a:r>
+            <a:r>
+              <a:rPr lang="en-US" sz="3200" b="1">
+                <a:solidFill>
+                  <a:srgbClr val="D4D4D4"/>
+                </a:solidFill>
+                <a:latin typeface="Consolas" panose="020B0609020204030204" pitchFamily="49" charset="0"/>
+              </a:rPr>
+              <a:t>This is some text.</a:t>
+            </a:r>
+            <a:r>
+              <a:rPr lang="en-US" sz="3200" b="1">
+                <a:solidFill>
+                  <a:srgbClr val="808080"/>
+                </a:solidFill>
+                <a:latin typeface="Consolas" panose="020B0609020204030204" pitchFamily="49" charset="0"/>
+              </a:rPr>
+              <a:t>&lt;/</a:t>
+            </a:r>
+            <a:r>
+              <a:rPr lang="en-US" sz="3200" b="1">
+                <a:solidFill>
+                  <a:srgbClr val="569CD6"/>
+                </a:solidFill>
+                <a:latin typeface="Consolas" panose="020B0609020204030204" pitchFamily="49" charset="0"/>
+              </a:rPr>
+              <a:t>p</a:t>
+            </a:r>
+            <a:r>
+              <a:rPr lang="en-US" sz="3200" b="1">
+                <a:solidFill>
+                  <a:srgbClr val="808080"/>
+                </a:solidFill>
+                <a:latin typeface="Consolas" panose="020B0609020204030204" pitchFamily="49" charset="0"/>
+              </a:rPr>
+              <a:t>&gt;</a:t>
+            </a:r>
+            <a:r>
+              <a:rPr lang="en-US" sz="3200" b="1">
+                <a:solidFill>
+                  <a:srgbClr val="D4D4D4"/>
+                </a:solidFill>
+                <a:latin typeface="Consolas" panose="020B0609020204030204" pitchFamily="49" charset="0"/>
+              </a:rPr>
+              <a:t> </a:t>
+            </a:r>
+          </a:p>
+          <a:p>
+            <a:r>
+              <a:rPr lang="en-US" sz="3200" b="1">
+                <a:solidFill>
+                  <a:srgbClr val="808080"/>
+                </a:solidFill>
+                <a:latin typeface="Consolas" panose="020B0609020204030204" pitchFamily="49" charset="0"/>
+              </a:rPr>
+              <a:t>&lt;/</a:t>
+            </a:r>
+            <a:r>
+              <a:rPr lang="en-US" sz="3200" b="1">
+                <a:solidFill>
+                  <a:srgbClr val="569CD6"/>
+                </a:solidFill>
+                <a:latin typeface="Consolas" panose="020B0609020204030204" pitchFamily="49" charset="0"/>
+              </a:rPr>
+              <a:t>div</a:t>
+            </a:r>
+            <a:r>
+              <a:rPr lang="en-US" sz="3200" b="1">
+                <a:solidFill>
+                  <a:srgbClr val="808080"/>
+                </a:solidFill>
+                <a:latin typeface="Consolas" panose="020B0609020204030204" pitchFamily="49" charset="0"/>
+              </a:rPr>
+              <a:t>&gt;</a:t>
+            </a:r>
+            <a:endParaRPr lang="en-US" sz="3200" b="1">
+              <a:solidFill>
+                <a:srgbClr val="D4D4D4"/>
+              </a:solidFill>
+              <a:latin typeface="Consolas" panose="020B0609020204030204" pitchFamily="49" charset="0"/>
+            </a:endParaRPr>
+          </a:p>
+          <a:p>
+            <a:endParaRPr lang="da-DK" sz="1400" b="1" smtClean="0">
+              <a:solidFill>
+                <a:srgbClr val="D4D4D4"/>
+              </a:solidFill>
+              <a:latin typeface="Consolas" panose="020B0609020204030204" pitchFamily="49" charset="0"/>
+            </a:endParaRPr>
+          </a:p>
+          <a:p>
+            <a:endParaRPr lang="da-DK" sz="1200"/>
+          </a:p>
+        </p:txBody>
+      </p:sp>
+    </p:spTree>
+    <p:extLst>
+      <p:ext uri="{BB962C8B-B14F-4D97-AF65-F5344CB8AC3E}">
+        <p14:creationId xmlns:p14="http://schemas.microsoft.com/office/powerpoint/2010/main" val="298550823"/>
+      </p:ext>
+    </p:extLst>
+  </p:cSld>
+  <p:clrMapOvr>
+    <a:masterClrMapping/>
+  </p:clrMapOvr>
+  <mc:AlternateContent xmlns:mc="http://schemas.openxmlformats.org/markup-compatibility/2006" xmlns:p14="http://schemas.microsoft.com/office/powerpoint/2010/main">
+    <mc:Choice Requires="p14">
+      <p:transition spd="med" p14:dur="700">
+        <p:fade/>
+      </p:transition>
+    </mc:Choice>
+    <mc:Fallback xmlns="">
+      <p:transition spd="med">
+        <p:fade/>
+      </p:transition>
+    </mc:Fallback>
+  </mc:AlternateContent>
   <p:timing>
     <p:tnLst>
       <p:par>

</xml_diff>